<commit_message>
Updated presentation Modified bivariate and multivariate analysis
</commit_message>
<xml_diff>
--- a/UvarajThulasiram.pptx
+++ b/UvarajThulasiram.pptx
@@ -5,10 +5,10 @@
     <p:sldMasterId id="2147483658" r:id="rId4"/>
   </p:sldMasterIdLst>
   <p:notesMasterIdLst>
-    <p:notesMasterId r:id="rId17"/>
+    <p:notesMasterId r:id="rId21"/>
   </p:notesMasterIdLst>
   <p:handoutMasterIdLst>
-    <p:handoutMasterId r:id="rId18"/>
+    <p:handoutMasterId r:id="rId22"/>
   </p:handoutMasterIdLst>
   <p:sldIdLst>
     <p:sldId id="410" r:id="rId5"/>
@@ -22,7 +22,11 @@
     <p:sldId id="416" r:id="rId13"/>
     <p:sldId id="417" r:id="rId14"/>
     <p:sldId id="418" r:id="rId15"/>
-    <p:sldId id="398" r:id="rId16"/>
+    <p:sldId id="419" r:id="rId16"/>
+    <p:sldId id="420" r:id="rId17"/>
+    <p:sldId id="421" r:id="rId18"/>
+    <p:sldId id="422" r:id="rId19"/>
+    <p:sldId id="398" r:id="rId20"/>
   </p:sldIdLst>
   <p:sldSz cx="12192000" cy="6858000"/>
   <p:notesSz cx="6858000" cy="9144000"/>
@@ -201,7 +205,7 @@
           <a:p>
             <a:fld id="{1EBEDD12-BCD5-485B-BCBC-34BB01D7923C}" type="datetimeFigureOut">
               <a:rPr lang="en-US" smtClean="0"/>
-              <a:t>12/20/2024</a:t>
+              <a:t>12/24/2024</a:t>
             </a:fld>
             <a:endParaRPr lang="en-US" dirty="0"/>
           </a:p>
@@ -415,7 +419,7 @@
           <a:p>
             <a:fld id="{6EE7A52F-9D89-7442-A8E9-48D1527B5F6B}" type="datetimeFigureOut">
               <a:rPr lang="en-US" smtClean="0"/>
-              <a:t>12/20/2024</a:t>
+              <a:t>12/24/2024</a:t>
             </a:fld>
             <a:endParaRPr lang="en-US" dirty="0"/>
           </a:p>
@@ -987,6 +991,438 @@
   <p:cSld>
     <p:spTree>
       <p:nvGrpSpPr>
+        <p:cNvPr id="1" name="">
+          <a:extLst>
+            <a:ext uri="{FF2B5EF4-FFF2-40B4-BE49-F238E27FC236}">
+              <a16:creationId xmlns:a16="http://schemas.microsoft.com/office/drawing/2014/main" id="{7E0D10B5-876B-C16F-EC36-84565F447A5A}"/>
+            </a:ext>
+          </a:extLst>
+        </p:cNvPr>
+        <p:cNvGrpSpPr/>
+        <p:nvPr/>
+      </p:nvGrpSpPr>
+      <p:grpSpPr>
+        <a:xfrm>
+          <a:off x="0" y="0"/>
+          <a:ext cx="0" cy="0"/>
+          <a:chOff x="0" y="0"/>
+          <a:chExt cx="0" cy="0"/>
+        </a:xfrm>
+      </p:grpSpPr>
+      <p:sp>
+        <p:nvSpPr>
+          <p:cNvPr id="2" name="Slide Image Placeholder 1">
+            <a:extLst>
+              <a:ext uri="{FF2B5EF4-FFF2-40B4-BE49-F238E27FC236}">
+                <a16:creationId xmlns:a16="http://schemas.microsoft.com/office/drawing/2014/main" id="{631B0BFE-65C6-AF3F-3A1C-209370F76F3C}"/>
+              </a:ext>
+            </a:extLst>
+          </p:cNvPr>
+          <p:cNvSpPr>
+            <a:spLocks noGrp="1" noRot="1" noChangeAspect="1"/>
+          </p:cNvSpPr>
+          <p:nvPr>
+            <p:ph type="sldImg"/>
+          </p:nvPr>
+        </p:nvSpPr>
+        <p:spPr/>
+      </p:sp>
+      <p:sp>
+        <p:nvSpPr>
+          <p:cNvPr id="3" name="Notes Placeholder 2">
+            <a:extLst>
+              <a:ext uri="{FF2B5EF4-FFF2-40B4-BE49-F238E27FC236}">
+                <a16:creationId xmlns:a16="http://schemas.microsoft.com/office/drawing/2014/main" id="{40F061B8-2C5D-8F62-4BB8-A1AADC7456E1}"/>
+              </a:ext>
+            </a:extLst>
+          </p:cNvPr>
+          <p:cNvSpPr>
+            <a:spLocks noGrp="1"/>
+          </p:cNvSpPr>
+          <p:nvPr>
+            <p:ph type="body" idx="1"/>
+          </p:nvPr>
+        </p:nvSpPr>
+        <p:spPr/>
+        <p:txBody>
+          <a:bodyPr/>
+          <a:lstStyle/>
+          <a:p>
+            <a:endParaRPr lang="en-US" dirty="0"/>
+          </a:p>
+        </p:txBody>
+      </p:sp>
+      <p:sp>
+        <p:nvSpPr>
+          <p:cNvPr id="4" name="Slide Number Placeholder 3">
+            <a:extLst>
+              <a:ext uri="{FF2B5EF4-FFF2-40B4-BE49-F238E27FC236}">
+                <a16:creationId xmlns:a16="http://schemas.microsoft.com/office/drawing/2014/main" id="{8818CDA7-5D0D-D8C9-53B8-C46344E4E5BD}"/>
+              </a:ext>
+            </a:extLst>
+          </p:cNvPr>
+          <p:cNvSpPr>
+            <a:spLocks noGrp="1"/>
+          </p:cNvSpPr>
+          <p:nvPr>
+            <p:ph type="sldNum" sz="quarter" idx="5"/>
+          </p:nvPr>
+        </p:nvSpPr>
+        <p:spPr/>
+        <p:txBody>
+          <a:bodyPr/>
+          <a:lstStyle/>
+          <a:p>
+            <a:fld id="{A89C7E07-3C67-C64C-8DA0-0404F6303970}" type="slidenum">
+              <a:rPr lang="en-US" smtClean="0"/>
+              <a:t>12</a:t>
+            </a:fld>
+            <a:endParaRPr lang="en-US" dirty="0"/>
+          </a:p>
+        </p:txBody>
+      </p:sp>
+    </p:spTree>
+    <p:extLst>
+      <p:ext uri="{BB962C8B-B14F-4D97-AF65-F5344CB8AC3E}">
+        <p14:creationId xmlns:p14="http://schemas.microsoft.com/office/powerpoint/2010/main" val="1504997852"/>
+      </p:ext>
+    </p:extLst>
+  </p:cSld>
+  <p:clrMapOvr>
+    <a:masterClrMapping/>
+  </p:clrMapOvr>
+</p:notes>
+</file>
+
+<file path=ppt/notesSlides/notesSlide13.xml><?xml version="1.0" encoding="utf-8"?>
+<p:notes xmlns:a="http://schemas.openxmlformats.org/drawingml/2006/main" xmlns:r="http://schemas.openxmlformats.org/officeDocument/2006/relationships" xmlns:p="http://schemas.openxmlformats.org/presentationml/2006/main">
+  <p:cSld>
+    <p:spTree>
+      <p:nvGrpSpPr>
+        <p:cNvPr id="1" name="">
+          <a:extLst>
+            <a:ext uri="{FF2B5EF4-FFF2-40B4-BE49-F238E27FC236}">
+              <a16:creationId xmlns:a16="http://schemas.microsoft.com/office/drawing/2014/main" id="{AB0AB6D3-CADB-73CC-1BB8-6B225134AF49}"/>
+            </a:ext>
+          </a:extLst>
+        </p:cNvPr>
+        <p:cNvGrpSpPr/>
+        <p:nvPr/>
+      </p:nvGrpSpPr>
+      <p:grpSpPr>
+        <a:xfrm>
+          <a:off x="0" y="0"/>
+          <a:ext cx="0" cy="0"/>
+          <a:chOff x="0" y="0"/>
+          <a:chExt cx="0" cy="0"/>
+        </a:xfrm>
+      </p:grpSpPr>
+      <p:sp>
+        <p:nvSpPr>
+          <p:cNvPr id="2" name="Slide Image Placeholder 1">
+            <a:extLst>
+              <a:ext uri="{FF2B5EF4-FFF2-40B4-BE49-F238E27FC236}">
+                <a16:creationId xmlns:a16="http://schemas.microsoft.com/office/drawing/2014/main" id="{09DFAEEE-BDD7-EE9A-F48F-C52F4FE14D7B}"/>
+              </a:ext>
+            </a:extLst>
+          </p:cNvPr>
+          <p:cNvSpPr>
+            <a:spLocks noGrp="1" noRot="1" noChangeAspect="1"/>
+          </p:cNvSpPr>
+          <p:nvPr>
+            <p:ph type="sldImg"/>
+          </p:nvPr>
+        </p:nvSpPr>
+        <p:spPr/>
+      </p:sp>
+      <p:sp>
+        <p:nvSpPr>
+          <p:cNvPr id="3" name="Notes Placeholder 2">
+            <a:extLst>
+              <a:ext uri="{FF2B5EF4-FFF2-40B4-BE49-F238E27FC236}">
+                <a16:creationId xmlns:a16="http://schemas.microsoft.com/office/drawing/2014/main" id="{CE0EC872-3992-3FE6-7ACF-9FBF53B9C24C}"/>
+              </a:ext>
+            </a:extLst>
+          </p:cNvPr>
+          <p:cNvSpPr>
+            <a:spLocks noGrp="1"/>
+          </p:cNvSpPr>
+          <p:nvPr>
+            <p:ph type="body" idx="1"/>
+          </p:nvPr>
+        </p:nvSpPr>
+        <p:spPr/>
+        <p:txBody>
+          <a:bodyPr/>
+          <a:lstStyle/>
+          <a:p>
+            <a:endParaRPr lang="en-US" dirty="0"/>
+          </a:p>
+        </p:txBody>
+      </p:sp>
+      <p:sp>
+        <p:nvSpPr>
+          <p:cNvPr id="4" name="Slide Number Placeholder 3">
+            <a:extLst>
+              <a:ext uri="{FF2B5EF4-FFF2-40B4-BE49-F238E27FC236}">
+                <a16:creationId xmlns:a16="http://schemas.microsoft.com/office/drawing/2014/main" id="{41D47FCA-D377-8790-D19A-FBCF59DDF86F}"/>
+              </a:ext>
+            </a:extLst>
+          </p:cNvPr>
+          <p:cNvSpPr>
+            <a:spLocks noGrp="1"/>
+          </p:cNvSpPr>
+          <p:nvPr>
+            <p:ph type="sldNum" sz="quarter" idx="5"/>
+          </p:nvPr>
+        </p:nvSpPr>
+        <p:spPr/>
+        <p:txBody>
+          <a:bodyPr/>
+          <a:lstStyle/>
+          <a:p>
+            <a:fld id="{A89C7E07-3C67-C64C-8DA0-0404F6303970}" type="slidenum">
+              <a:rPr lang="en-US" smtClean="0"/>
+              <a:t>13</a:t>
+            </a:fld>
+            <a:endParaRPr lang="en-US" dirty="0"/>
+          </a:p>
+        </p:txBody>
+      </p:sp>
+    </p:spTree>
+    <p:extLst>
+      <p:ext uri="{BB962C8B-B14F-4D97-AF65-F5344CB8AC3E}">
+        <p14:creationId xmlns:p14="http://schemas.microsoft.com/office/powerpoint/2010/main" val="1079242164"/>
+      </p:ext>
+    </p:extLst>
+  </p:cSld>
+  <p:clrMapOvr>
+    <a:masterClrMapping/>
+  </p:clrMapOvr>
+</p:notes>
+</file>
+
+<file path=ppt/notesSlides/notesSlide14.xml><?xml version="1.0" encoding="utf-8"?>
+<p:notes xmlns:a="http://schemas.openxmlformats.org/drawingml/2006/main" xmlns:r="http://schemas.openxmlformats.org/officeDocument/2006/relationships" xmlns:p="http://schemas.openxmlformats.org/presentationml/2006/main">
+  <p:cSld>
+    <p:spTree>
+      <p:nvGrpSpPr>
+        <p:cNvPr id="1" name="">
+          <a:extLst>
+            <a:ext uri="{FF2B5EF4-FFF2-40B4-BE49-F238E27FC236}">
+              <a16:creationId xmlns:a16="http://schemas.microsoft.com/office/drawing/2014/main" id="{A03B47C9-7D44-8DE4-FAEB-090C07AB4628}"/>
+            </a:ext>
+          </a:extLst>
+        </p:cNvPr>
+        <p:cNvGrpSpPr/>
+        <p:nvPr/>
+      </p:nvGrpSpPr>
+      <p:grpSpPr>
+        <a:xfrm>
+          <a:off x="0" y="0"/>
+          <a:ext cx="0" cy="0"/>
+          <a:chOff x="0" y="0"/>
+          <a:chExt cx="0" cy="0"/>
+        </a:xfrm>
+      </p:grpSpPr>
+      <p:sp>
+        <p:nvSpPr>
+          <p:cNvPr id="2" name="Slide Image Placeholder 1">
+            <a:extLst>
+              <a:ext uri="{FF2B5EF4-FFF2-40B4-BE49-F238E27FC236}">
+                <a16:creationId xmlns:a16="http://schemas.microsoft.com/office/drawing/2014/main" id="{69876FF0-07FF-DF5F-0010-D72C141D720B}"/>
+              </a:ext>
+            </a:extLst>
+          </p:cNvPr>
+          <p:cNvSpPr>
+            <a:spLocks noGrp="1" noRot="1" noChangeAspect="1"/>
+          </p:cNvSpPr>
+          <p:nvPr>
+            <p:ph type="sldImg"/>
+          </p:nvPr>
+        </p:nvSpPr>
+        <p:spPr/>
+      </p:sp>
+      <p:sp>
+        <p:nvSpPr>
+          <p:cNvPr id="3" name="Notes Placeholder 2">
+            <a:extLst>
+              <a:ext uri="{FF2B5EF4-FFF2-40B4-BE49-F238E27FC236}">
+                <a16:creationId xmlns:a16="http://schemas.microsoft.com/office/drawing/2014/main" id="{EF22CC26-C8A2-8B33-8B0C-892DDABF1CF7}"/>
+              </a:ext>
+            </a:extLst>
+          </p:cNvPr>
+          <p:cNvSpPr>
+            <a:spLocks noGrp="1"/>
+          </p:cNvSpPr>
+          <p:nvPr>
+            <p:ph type="body" idx="1"/>
+          </p:nvPr>
+        </p:nvSpPr>
+        <p:spPr/>
+        <p:txBody>
+          <a:bodyPr/>
+          <a:lstStyle/>
+          <a:p>
+            <a:endParaRPr lang="en-US" dirty="0"/>
+          </a:p>
+        </p:txBody>
+      </p:sp>
+      <p:sp>
+        <p:nvSpPr>
+          <p:cNvPr id="4" name="Slide Number Placeholder 3">
+            <a:extLst>
+              <a:ext uri="{FF2B5EF4-FFF2-40B4-BE49-F238E27FC236}">
+                <a16:creationId xmlns:a16="http://schemas.microsoft.com/office/drawing/2014/main" id="{7C9F5076-7D29-2A0D-D270-26ED77666A38}"/>
+              </a:ext>
+            </a:extLst>
+          </p:cNvPr>
+          <p:cNvSpPr>
+            <a:spLocks noGrp="1"/>
+          </p:cNvSpPr>
+          <p:nvPr>
+            <p:ph type="sldNum" sz="quarter" idx="5"/>
+          </p:nvPr>
+        </p:nvSpPr>
+        <p:spPr/>
+        <p:txBody>
+          <a:bodyPr/>
+          <a:lstStyle/>
+          <a:p>
+            <a:fld id="{A89C7E07-3C67-C64C-8DA0-0404F6303970}" type="slidenum">
+              <a:rPr lang="en-US" smtClean="0"/>
+              <a:t>14</a:t>
+            </a:fld>
+            <a:endParaRPr lang="en-US" dirty="0"/>
+          </a:p>
+        </p:txBody>
+      </p:sp>
+    </p:spTree>
+    <p:extLst>
+      <p:ext uri="{BB962C8B-B14F-4D97-AF65-F5344CB8AC3E}">
+        <p14:creationId xmlns:p14="http://schemas.microsoft.com/office/powerpoint/2010/main" val="1824913028"/>
+      </p:ext>
+    </p:extLst>
+  </p:cSld>
+  <p:clrMapOvr>
+    <a:masterClrMapping/>
+  </p:clrMapOvr>
+</p:notes>
+</file>
+
+<file path=ppt/notesSlides/notesSlide15.xml><?xml version="1.0" encoding="utf-8"?>
+<p:notes xmlns:a="http://schemas.openxmlformats.org/drawingml/2006/main" xmlns:r="http://schemas.openxmlformats.org/officeDocument/2006/relationships" xmlns:p="http://schemas.openxmlformats.org/presentationml/2006/main">
+  <p:cSld>
+    <p:spTree>
+      <p:nvGrpSpPr>
+        <p:cNvPr id="1" name="">
+          <a:extLst>
+            <a:ext uri="{FF2B5EF4-FFF2-40B4-BE49-F238E27FC236}">
+              <a16:creationId xmlns:a16="http://schemas.microsoft.com/office/drawing/2014/main" id="{3A778A13-1C7B-F0F0-6892-252FD2998325}"/>
+            </a:ext>
+          </a:extLst>
+        </p:cNvPr>
+        <p:cNvGrpSpPr/>
+        <p:nvPr/>
+      </p:nvGrpSpPr>
+      <p:grpSpPr>
+        <a:xfrm>
+          <a:off x="0" y="0"/>
+          <a:ext cx="0" cy="0"/>
+          <a:chOff x="0" y="0"/>
+          <a:chExt cx="0" cy="0"/>
+        </a:xfrm>
+      </p:grpSpPr>
+      <p:sp>
+        <p:nvSpPr>
+          <p:cNvPr id="2" name="Slide Image Placeholder 1">
+            <a:extLst>
+              <a:ext uri="{FF2B5EF4-FFF2-40B4-BE49-F238E27FC236}">
+                <a16:creationId xmlns:a16="http://schemas.microsoft.com/office/drawing/2014/main" id="{FDA81FEA-787D-52B8-7D6C-25A3D9486C55}"/>
+              </a:ext>
+            </a:extLst>
+          </p:cNvPr>
+          <p:cNvSpPr>
+            <a:spLocks noGrp="1" noRot="1" noChangeAspect="1"/>
+          </p:cNvSpPr>
+          <p:nvPr>
+            <p:ph type="sldImg"/>
+          </p:nvPr>
+        </p:nvSpPr>
+        <p:spPr/>
+      </p:sp>
+      <p:sp>
+        <p:nvSpPr>
+          <p:cNvPr id="3" name="Notes Placeholder 2">
+            <a:extLst>
+              <a:ext uri="{FF2B5EF4-FFF2-40B4-BE49-F238E27FC236}">
+                <a16:creationId xmlns:a16="http://schemas.microsoft.com/office/drawing/2014/main" id="{444E5339-2C50-2006-690F-95A0424AC92E}"/>
+              </a:ext>
+            </a:extLst>
+          </p:cNvPr>
+          <p:cNvSpPr>
+            <a:spLocks noGrp="1"/>
+          </p:cNvSpPr>
+          <p:nvPr>
+            <p:ph type="body" idx="1"/>
+          </p:nvPr>
+        </p:nvSpPr>
+        <p:spPr/>
+        <p:txBody>
+          <a:bodyPr/>
+          <a:lstStyle/>
+          <a:p>
+            <a:endParaRPr lang="en-US" dirty="0"/>
+          </a:p>
+        </p:txBody>
+      </p:sp>
+      <p:sp>
+        <p:nvSpPr>
+          <p:cNvPr id="4" name="Slide Number Placeholder 3">
+            <a:extLst>
+              <a:ext uri="{FF2B5EF4-FFF2-40B4-BE49-F238E27FC236}">
+                <a16:creationId xmlns:a16="http://schemas.microsoft.com/office/drawing/2014/main" id="{F9FBFB71-1942-4763-E418-FEF24C293EA6}"/>
+              </a:ext>
+            </a:extLst>
+          </p:cNvPr>
+          <p:cNvSpPr>
+            <a:spLocks noGrp="1"/>
+          </p:cNvSpPr>
+          <p:nvPr>
+            <p:ph type="sldNum" sz="quarter" idx="5"/>
+          </p:nvPr>
+        </p:nvSpPr>
+        <p:spPr/>
+        <p:txBody>
+          <a:bodyPr/>
+          <a:lstStyle/>
+          <a:p>
+            <a:fld id="{A89C7E07-3C67-C64C-8DA0-0404F6303970}" type="slidenum">
+              <a:rPr lang="en-US" smtClean="0"/>
+              <a:t>15</a:t>
+            </a:fld>
+            <a:endParaRPr lang="en-US" dirty="0"/>
+          </a:p>
+        </p:txBody>
+      </p:sp>
+    </p:spTree>
+    <p:extLst>
+      <p:ext uri="{BB962C8B-B14F-4D97-AF65-F5344CB8AC3E}">
+        <p14:creationId xmlns:p14="http://schemas.microsoft.com/office/powerpoint/2010/main" val="324205276"/>
+      </p:ext>
+    </p:extLst>
+  </p:cSld>
+  <p:clrMapOvr>
+    <a:masterClrMapping/>
+  </p:clrMapOvr>
+</p:notes>
+</file>
+
+<file path=ppt/notesSlides/notesSlide16.xml><?xml version="1.0" encoding="utf-8"?>
+<p:notes xmlns:a="http://schemas.openxmlformats.org/drawingml/2006/main" xmlns:r="http://schemas.openxmlformats.org/officeDocument/2006/relationships" xmlns:p="http://schemas.openxmlformats.org/presentationml/2006/main">
+  <p:cSld>
+    <p:spTree>
+      <p:nvGrpSpPr>
         <p:cNvPr id="1" name=""/>
         <p:cNvGrpSpPr/>
         <p:nvPr/>
@@ -1047,7 +1483,7 @@
           <a:p>
             <a:fld id="{A89C7E07-3C67-C64C-8DA0-0404F6303970}" type="slidenum">
               <a:rPr lang="en-US" smtClean="0"/>
-              <a:t>12</a:t>
+              <a:t>16</a:t>
             </a:fld>
             <a:endParaRPr lang="en-US" dirty="0"/>
           </a:p>
@@ -10540,8 +10976,8 @@
         </p:nvSpPr>
         <p:spPr>
           <a:xfrm>
-            <a:off x="594360" y="1338503"/>
-            <a:ext cx="3220258" cy="867930"/>
+            <a:off x="594360" y="1600807"/>
+            <a:ext cx="3220258" cy="3656386"/>
           </a:xfrm>
           <a:prstGeom prst="rect">
             <a:avLst/>
@@ -10571,17 +11007,48 @@
                   <a:schemeClr val="bg1"/>
                 </a:solidFill>
               </a:rPr>
-              <a:t>To-do</a:t>
-            </a:r>
-          </a:p>
-          <a:p>
-            <a:endParaRPr lang="en-US" dirty="0">
-              <a:solidFill>
-                <a:schemeClr val="bg1"/>
-              </a:solidFill>
-            </a:endParaRPr>
-          </a:p>
-          <a:p>
+              <a:t>Bivariate analysis helps validate assumptions and clarify insights derived from univariate analysis. </a:t>
+            </a:r>
+          </a:p>
+          <a:p>
+            <a:pPr marL="285750" indent="-285750">
+              <a:lnSpc>
+                <a:spcPct val="90000"/>
+              </a:lnSpc>
+              <a:spcBef>
+                <a:spcPts val="1800"/>
+              </a:spcBef>
+              <a:buFont typeface="Arial" panose="020B0604020202020204" pitchFamily="34" charset="0"/>
+              <a:buChar char="•"/>
+            </a:pPr>
+            <a:r>
+              <a:rPr lang="en-US" sz="1600" dirty="0">
+                <a:solidFill>
+                  <a:schemeClr val="bg1"/>
+                </a:solidFill>
+              </a:rPr>
+              <a:t>The first chart on the right shows that borrowers with lower subgrades tend to take larger loans at higher interest rates and default more frequently, leading to a higher number of charged-off loans. </a:t>
+            </a:r>
+          </a:p>
+          <a:p>
+            <a:pPr marL="285750" indent="-285750">
+              <a:lnSpc>
+                <a:spcPct val="90000"/>
+              </a:lnSpc>
+              <a:spcBef>
+                <a:spcPts val="1800"/>
+              </a:spcBef>
+              <a:buFont typeface="Arial" panose="020B0604020202020204" pitchFamily="34" charset="0"/>
+              <a:buChar char="•"/>
+            </a:pPr>
+            <a:r>
+              <a:rPr lang="en-US" sz="1600" dirty="0">
+                <a:solidFill>
+                  <a:schemeClr val="bg1"/>
+                </a:solidFill>
+              </a:rPr>
+              <a:t>The second chart reinforces this observation by illustrating the distribution of loan amounts across different grades.</a:t>
+            </a:r>
             <a:endParaRPr lang="en-US" dirty="0">
               <a:solidFill>
                 <a:schemeClr val="bg1"/>
@@ -10664,6 +11131,1307 @@
 </file>
 
 <file path=ppt/slides/slide12.xml><?xml version="1.0" encoding="utf-8"?>
+<p:sld xmlns:a="http://schemas.openxmlformats.org/drawingml/2006/main" xmlns:r="http://schemas.openxmlformats.org/officeDocument/2006/relationships" xmlns:p="http://schemas.openxmlformats.org/presentationml/2006/main">
+  <p:cSld>
+    <p:spTree>
+      <p:nvGrpSpPr>
+        <p:cNvPr id="1" name="">
+          <a:extLst>
+            <a:ext uri="{FF2B5EF4-FFF2-40B4-BE49-F238E27FC236}">
+              <a16:creationId xmlns:a16="http://schemas.microsoft.com/office/drawing/2014/main" id="{52E66983-FE15-9156-0DD0-E826A3FB8AEC}"/>
+            </a:ext>
+          </a:extLst>
+        </p:cNvPr>
+        <p:cNvGrpSpPr/>
+        <p:nvPr/>
+      </p:nvGrpSpPr>
+      <p:grpSpPr>
+        <a:xfrm>
+          <a:off x="0" y="0"/>
+          <a:ext cx="0" cy="0"/>
+          <a:chOff x="0" y="0"/>
+          <a:chExt cx="0" cy="0"/>
+        </a:xfrm>
+      </p:grpSpPr>
+      <p:sp>
+        <p:nvSpPr>
+          <p:cNvPr id="3" name="Title 2">
+            <a:extLst>
+              <a:ext uri="{FF2B5EF4-FFF2-40B4-BE49-F238E27FC236}">
+                <a16:creationId xmlns:a16="http://schemas.microsoft.com/office/drawing/2014/main" id="{91EFF3A1-1E50-6DAA-C9B7-E00B7261C2D1}"/>
+              </a:ext>
+            </a:extLst>
+          </p:cNvPr>
+          <p:cNvSpPr>
+            <a:spLocks noGrp="1"/>
+          </p:cNvSpPr>
+          <p:nvPr>
+            <p:ph type="title"/>
+          </p:nvPr>
+        </p:nvSpPr>
+        <p:spPr>
+          <a:xfrm>
+            <a:off x="594360" y="102875"/>
+            <a:ext cx="10873740" cy="773425"/>
+          </a:xfrm>
+        </p:spPr>
+        <p:txBody>
+          <a:bodyPr/>
+          <a:lstStyle/>
+          <a:p>
+            <a:r>
+              <a:rPr lang="en-US" sz="3600" dirty="0"/>
+              <a:t>4. EDA – Bivariate Analysis</a:t>
+            </a:r>
+          </a:p>
+        </p:txBody>
+      </p:sp>
+      <p:sp>
+        <p:nvSpPr>
+          <p:cNvPr id="15" name="TextBox 14">
+            <a:extLst>
+              <a:ext uri="{FF2B5EF4-FFF2-40B4-BE49-F238E27FC236}">
+                <a16:creationId xmlns:a16="http://schemas.microsoft.com/office/drawing/2014/main" id="{3CE8E44C-7712-01FB-4E57-1FD2A89C71F3}"/>
+              </a:ext>
+            </a:extLst>
+          </p:cNvPr>
+          <p:cNvSpPr txBox="1"/>
+          <p:nvPr/>
+        </p:nvSpPr>
+        <p:spPr>
+          <a:xfrm>
+            <a:off x="7845529" y="1093328"/>
+            <a:ext cx="3971923" cy="5456878"/>
+          </a:xfrm>
+          <a:prstGeom prst="rect">
+            <a:avLst/>
+          </a:prstGeom>
+          <a:noFill/>
+          <a:ln>
+            <a:noFill/>
+          </a:ln>
+        </p:spPr>
+        <p:txBody>
+          <a:bodyPr wrap="square" rtlCol="0">
+            <a:spAutoFit/>
+          </a:bodyPr>
+          <a:lstStyle/>
+          <a:p>
+            <a:pPr>
+              <a:lnSpc>
+                <a:spcPct val="90000"/>
+              </a:lnSpc>
+              <a:spcBef>
+                <a:spcPts val="1800"/>
+              </a:spcBef>
+            </a:pPr>
+            <a:r>
+              <a:rPr lang="en-US" sz="1600" b="1" dirty="0">
+                <a:solidFill>
+                  <a:schemeClr val="bg1"/>
+                </a:solidFill>
+              </a:rPr>
+              <a:t>Key insights from the heatmap,</a:t>
+            </a:r>
+          </a:p>
+          <a:p>
+            <a:pPr marL="285750" indent="-285750">
+              <a:lnSpc>
+                <a:spcPct val="90000"/>
+              </a:lnSpc>
+              <a:spcBef>
+                <a:spcPts val="1800"/>
+              </a:spcBef>
+              <a:buFont typeface="Arial" panose="020B0604020202020204" pitchFamily="34" charset="0"/>
+              <a:buChar char="•"/>
+            </a:pPr>
+            <a:r>
+              <a:rPr lang="en-US" sz="1600" dirty="0">
+                <a:solidFill>
+                  <a:schemeClr val="bg1"/>
+                </a:solidFill>
+              </a:rPr>
+              <a:t>A </a:t>
+            </a:r>
+            <a:r>
+              <a:rPr lang="en-US" sz="1600" dirty="0">
+                <a:solidFill>
+                  <a:schemeClr val="bg1"/>
+                </a:solidFill>
+                <a:highlight>
+                  <a:srgbClr val="FFFF00"/>
+                </a:highlight>
+              </a:rPr>
+              <a:t>strong correlation (93%) </a:t>
+            </a:r>
+            <a:r>
+              <a:rPr lang="en-US" sz="1600" dirty="0">
+                <a:solidFill>
+                  <a:schemeClr val="bg1"/>
+                </a:solidFill>
+              </a:rPr>
+              <a:t>between </a:t>
+            </a:r>
+            <a:r>
+              <a:rPr lang="en-US" sz="1600" dirty="0" err="1">
+                <a:solidFill>
+                  <a:schemeClr val="bg1"/>
+                </a:solidFill>
+              </a:rPr>
+              <a:t>loan_amnt</a:t>
+            </a:r>
+            <a:r>
+              <a:rPr lang="en-US" sz="1600" dirty="0">
+                <a:solidFill>
+                  <a:schemeClr val="bg1"/>
+                </a:solidFill>
+              </a:rPr>
+              <a:t> and installment highlights that higher loans directly result in larger installment amounts.</a:t>
+            </a:r>
+          </a:p>
+          <a:p>
+            <a:pPr marL="285750" indent="-285750">
+              <a:lnSpc>
+                <a:spcPct val="90000"/>
+              </a:lnSpc>
+              <a:spcBef>
+                <a:spcPts val="1800"/>
+              </a:spcBef>
+              <a:buFont typeface="Arial" panose="020B0604020202020204" pitchFamily="34" charset="0"/>
+              <a:buChar char="•"/>
+            </a:pPr>
+            <a:r>
+              <a:rPr lang="en-US" sz="1600" dirty="0">
+                <a:solidFill>
+                  <a:schemeClr val="bg1"/>
+                </a:solidFill>
+              </a:rPr>
+              <a:t>47% correlation between </a:t>
+            </a:r>
+            <a:r>
+              <a:rPr lang="en-US" sz="1600" dirty="0" err="1">
+                <a:solidFill>
+                  <a:schemeClr val="bg1"/>
+                </a:solidFill>
+              </a:rPr>
+              <a:t>revol_util</a:t>
+            </a:r>
+            <a:r>
+              <a:rPr lang="en-US" sz="1600" dirty="0">
+                <a:solidFill>
+                  <a:schemeClr val="bg1"/>
+                </a:solidFill>
+              </a:rPr>
+              <a:t> and </a:t>
+            </a:r>
+            <a:r>
+              <a:rPr lang="en-US" sz="1600" dirty="0" err="1">
+                <a:solidFill>
+                  <a:schemeClr val="bg1"/>
+                </a:solidFill>
+              </a:rPr>
+              <a:t>int_rate</a:t>
+            </a:r>
+            <a:r>
+              <a:rPr lang="en-US" sz="1600" dirty="0">
+                <a:solidFill>
+                  <a:schemeClr val="bg1"/>
+                </a:solidFill>
+              </a:rPr>
+              <a:t> suggests borrowers with higher credit utilization often face higher interest rates.</a:t>
+            </a:r>
+          </a:p>
+          <a:p>
+            <a:pPr marL="285750" indent="-285750">
+              <a:lnSpc>
+                <a:spcPct val="90000"/>
+              </a:lnSpc>
+              <a:spcBef>
+                <a:spcPts val="1800"/>
+              </a:spcBef>
+              <a:buFont typeface="Arial" panose="020B0604020202020204" pitchFamily="34" charset="0"/>
+              <a:buChar char="•"/>
+            </a:pPr>
+            <a:r>
+              <a:rPr lang="en-US" sz="1600" dirty="0">
+                <a:solidFill>
+                  <a:schemeClr val="bg1"/>
+                </a:solidFill>
+              </a:rPr>
+              <a:t>A moderate positive correlation (36%) between </a:t>
+            </a:r>
+            <a:r>
+              <a:rPr lang="en-US" sz="1600" dirty="0" err="1">
+                <a:solidFill>
+                  <a:schemeClr val="bg1"/>
+                </a:solidFill>
+              </a:rPr>
+              <a:t>annual_inc</a:t>
+            </a:r>
+            <a:r>
+              <a:rPr lang="en-US" sz="1600" dirty="0">
+                <a:solidFill>
+                  <a:schemeClr val="bg1"/>
+                </a:solidFill>
+              </a:rPr>
+              <a:t> and </a:t>
+            </a:r>
+            <a:r>
+              <a:rPr lang="en-US" sz="1600" dirty="0" err="1">
+                <a:solidFill>
+                  <a:schemeClr val="bg1"/>
+                </a:solidFill>
+              </a:rPr>
+              <a:t>loan_amnt</a:t>
+            </a:r>
+            <a:r>
+              <a:rPr lang="en-US" sz="1600" dirty="0">
+                <a:solidFill>
+                  <a:schemeClr val="bg1"/>
+                </a:solidFill>
+              </a:rPr>
+              <a:t> indicates that </a:t>
+            </a:r>
+            <a:r>
+              <a:rPr lang="en-US" sz="1600" dirty="0">
+                <a:solidFill>
+                  <a:schemeClr val="bg1"/>
+                </a:solidFill>
+                <a:highlight>
+                  <a:srgbClr val="FFFF00"/>
+                </a:highlight>
+              </a:rPr>
+              <a:t>higher-income borrowers tend to take larger loans</a:t>
+            </a:r>
+            <a:r>
+              <a:rPr lang="en-US" sz="1600" dirty="0">
+                <a:solidFill>
+                  <a:schemeClr val="bg1"/>
+                </a:solidFill>
+              </a:rPr>
+              <a:t>.</a:t>
+            </a:r>
+          </a:p>
+          <a:p>
+            <a:pPr marL="285750" indent="-285750">
+              <a:lnSpc>
+                <a:spcPct val="90000"/>
+              </a:lnSpc>
+              <a:spcBef>
+                <a:spcPts val="1800"/>
+              </a:spcBef>
+              <a:buFont typeface="Arial" panose="020B0604020202020204" pitchFamily="34" charset="0"/>
+              <a:buChar char="•"/>
+            </a:pPr>
+            <a:r>
+              <a:rPr lang="en-US" sz="1600" dirty="0">
+                <a:solidFill>
+                  <a:schemeClr val="bg1"/>
+                </a:solidFill>
+                <a:highlight>
+                  <a:srgbClr val="FFFF00"/>
+                </a:highlight>
+              </a:rPr>
+              <a:t>Public derogatory records and bankruptcies are strongly associated. </a:t>
+            </a:r>
+            <a:r>
+              <a:rPr lang="en-US" sz="1600" dirty="0">
+                <a:solidFill>
+                  <a:schemeClr val="bg1"/>
+                </a:solidFill>
+              </a:rPr>
+              <a:t>An 85% correlation indicates high risk.</a:t>
+            </a:r>
+          </a:p>
+          <a:p>
+            <a:pPr marL="285750" indent="-285750">
+              <a:lnSpc>
+                <a:spcPct val="90000"/>
+              </a:lnSpc>
+              <a:spcBef>
+                <a:spcPts val="1800"/>
+              </a:spcBef>
+              <a:buFont typeface="Arial" panose="020B0604020202020204" pitchFamily="34" charset="0"/>
+              <a:buChar char="•"/>
+            </a:pPr>
+            <a:r>
+              <a:rPr lang="en-US" sz="1600" dirty="0">
+                <a:solidFill>
+                  <a:schemeClr val="bg1"/>
+                </a:solidFill>
+              </a:rPr>
+              <a:t>Surprisingly debt-to-income ratio has minimal impact on </a:t>
+            </a:r>
+            <a:r>
+              <a:rPr lang="en-US" sz="1600" dirty="0" err="1">
+                <a:solidFill>
+                  <a:schemeClr val="bg1"/>
+                </a:solidFill>
+              </a:rPr>
+              <a:t>loan_amnt</a:t>
+            </a:r>
+            <a:r>
+              <a:rPr lang="en-US" sz="1600" dirty="0">
+                <a:solidFill>
+                  <a:schemeClr val="bg1"/>
+                </a:solidFill>
+              </a:rPr>
+              <a:t> and </a:t>
+            </a:r>
+            <a:r>
+              <a:rPr lang="en-US" sz="1600" dirty="0" err="1">
+                <a:solidFill>
+                  <a:schemeClr val="bg1"/>
+                </a:solidFill>
+              </a:rPr>
+              <a:t>annual_inc</a:t>
+            </a:r>
+            <a:endParaRPr lang="en-US" dirty="0">
+              <a:solidFill>
+                <a:schemeClr val="bg1"/>
+              </a:solidFill>
+            </a:endParaRPr>
+          </a:p>
+        </p:txBody>
+      </p:sp>
+      <p:pic>
+        <p:nvPicPr>
+          <p:cNvPr id="4" name="Picture 3">
+            <a:extLst>
+              <a:ext uri="{FF2B5EF4-FFF2-40B4-BE49-F238E27FC236}">
+                <a16:creationId xmlns:a16="http://schemas.microsoft.com/office/drawing/2014/main" id="{8DB72C19-50E4-9F5C-16C9-9AE1414AC31A}"/>
+              </a:ext>
+            </a:extLst>
+          </p:cNvPr>
+          <p:cNvPicPr>
+            <a:picLocks noChangeAspect="1"/>
+          </p:cNvPicPr>
+          <p:nvPr/>
+        </p:nvPicPr>
+        <p:blipFill>
+          <a:blip r:embed="rId3"/>
+          <a:stretch>
+            <a:fillRect/>
+          </a:stretch>
+        </p:blipFill>
+        <p:spPr>
+          <a:xfrm>
+            <a:off x="185738" y="1657350"/>
+            <a:ext cx="7505699" cy="3580640"/>
+          </a:xfrm>
+          <a:prstGeom prst="rect">
+            <a:avLst/>
+          </a:prstGeom>
+        </p:spPr>
+      </p:pic>
+      <p:sp>
+        <p:nvSpPr>
+          <p:cNvPr id="6" name="Title 2">
+            <a:extLst>
+              <a:ext uri="{FF2B5EF4-FFF2-40B4-BE49-F238E27FC236}">
+                <a16:creationId xmlns:a16="http://schemas.microsoft.com/office/drawing/2014/main" id="{9929B314-C2E3-7272-93B9-7CA349E3929C}"/>
+              </a:ext>
+            </a:extLst>
+          </p:cNvPr>
+          <p:cNvSpPr txBox="1">
+            <a:spLocks/>
+          </p:cNvSpPr>
+          <p:nvPr/>
+        </p:nvSpPr>
+        <p:spPr>
+          <a:xfrm>
+            <a:off x="1114852" y="5416756"/>
+            <a:ext cx="6111240" cy="773425"/>
+          </a:xfrm>
+          <a:prstGeom prst="rect">
+            <a:avLst/>
+          </a:prstGeom>
+        </p:spPr>
+        <p:txBody>
+          <a:bodyPr vert="horz" lIns="0" tIns="0" rIns="0" bIns="0" rtlCol="0" anchor="b" anchorCtr="0">
+            <a:noAutofit/>
+          </a:bodyPr>
+          <a:lstStyle>
+            <a:lvl1pPr algn="l" defTabSz="914400" rtl="0" eaLnBrk="1" latinLnBrk="0" hangingPunct="1">
+              <a:lnSpc>
+                <a:spcPct val="80000"/>
+              </a:lnSpc>
+              <a:spcBef>
+                <a:spcPct val="0"/>
+              </a:spcBef>
+              <a:buNone/>
+              <a:defRPr sz="4400" b="1" i="0" kern="1200" spc="100" baseline="0">
+                <a:solidFill>
+                  <a:schemeClr val="bg1"/>
+                </a:solidFill>
+                <a:latin typeface="+mj-lt"/>
+                <a:ea typeface="+mj-ea"/>
+                <a:cs typeface="+mj-cs"/>
+              </a:defRPr>
+            </a:lvl1pPr>
+            <a:lvl2pPr eaLnBrk="1" hangingPunct="1">
+              <a:defRPr>
+                <a:solidFill>
+                  <a:schemeClr val="tx2"/>
+                </a:solidFill>
+              </a:defRPr>
+            </a:lvl2pPr>
+            <a:lvl3pPr eaLnBrk="1" hangingPunct="1">
+              <a:defRPr>
+                <a:solidFill>
+                  <a:schemeClr val="tx2"/>
+                </a:solidFill>
+              </a:defRPr>
+            </a:lvl3pPr>
+            <a:lvl4pPr eaLnBrk="1" hangingPunct="1">
+              <a:defRPr>
+                <a:solidFill>
+                  <a:schemeClr val="tx2"/>
+                </a:solidFill>
+              </a:defRPr>
+            </a:lvl4pPr>
+            <a:lvl5pPr eaLnBrk="1" hangingPunct="1">
+              <a:defRPr>
+                <a:solidFill>
+                  <a:schemeClr val="tx2"/>
+                </a:solidFill>
+              </a:defRPr>
+            </a:lvl5pPr>
+            <a:lvl6pPr eaLnBrk="1" hangingPunct="1">
+              <a:defRPr>
+                <a:solidFill>
+                  <a:schemeClr val="tx2"/>
+                </a:solidFill>
+              </a:defRPr>
+            </a:lvl6pPr>
+            <a:lvl7pPr eaLnBrk="1" hangingPunct="1">
+              <a:defRPr>
+                <a:solidFill>
+                  <a:schemeClr val="tx2"/>
+                </a:solidFill>
+              </a:defRPr>
+            </a:lvl7pPr>
+            <a:lvl8pPr eaLnBrk="1" hangingPunct="1">
+              <a:defRPr>
+                <a:solidFill>
+                  <a:schemeClr val="tx2"/>
+                </a:solidFill>
+              </a:defRPr>
+            </a:lvl8pPr>
+            <a:lvl9pPr eaLnBrk="1" hangingPunct="1">
+              <a:defRPr>
+                <a:solidFill>
+                  <a:schemeClr val="tx2"/>
+                </a:solidFill>
+              </a:defRPr>
+            </a:lvl9pPr>
+          </a:lstStyle>
+          <a:p>
+            <a:pPr algn="ctr"/>
+            <a:r>
+              <a:rPr lang="en-US" sz="2000" b="0" dirty="0"/>
+              <a:t>Heatmap based on correlation matrix between numeric variables</a:t>
+            </a:r>
+          </a:p>
+        </p:txBody>
+      </p:sp>
+    </p:spTree>
+    <p:extLst>
+      <p:ext uri="{BB962C8B-B14F-4D97-AF65-F5344CB8AC3E}">
+        <p14:creationId xmlns:p14="http://schemas.microsoft.com/office/powerpoint/2010/main" val="866741026"/>
+      </p:ext>
+    </p:extLst>
+  </p:cSld>
+  <p:clrMapOvr>
+    <a:masterClrMapping/>
+  </p:clrMapOvr>
+</p:sld>
+</file>
+
+<file path=ppt/slides/slide13.xml><?xml version="1.0" encoding="utf-8"?>
+<p:sld xmlns:a="http://schemas.openxmlformats.org/drawingml/2006/main" xmlns:r="http://schemas.openxmlformats.org/officeDocument/2006/relationships" xmlns:p="http://schemas.openxmlformats.org/presentationml/2006/main">
+  <p:cSld>
+    <p:spTree>
+      <p:nvGrpSpPr>
+        <p:cNvPr id="1" name="">
+          <a:extLst>
+            <a:ext uri="{FF2B5EF4-FFF2-40B4-BE49-F238E27FC236}">
+              <a16:creationId xmlns:a16="http://schemas.microsoft.com/office/drawing/2014/main" id="{C9077ACE-6D16-2404-0292-AFFB74A3BF8C}"/>
+            </a:ext>
+          </a:extLst>
+        </p:cNvPr>
+        <p:cNvGrpSpPr/>
+        <p:nvPr/>
+      </p:nvGrpSpPr>
+      <p:grpSpPr>
+        <a:xfrm>
+          <a:off x="0" y="0"/>
+          <a:ext cx="0" cy="0"/>
+          <a:chOff x="0" y="0"/>
+          <a:chExt cx="0" cy="0"/>
+        </a:xfrm>
+      </p:grpSpPr>
+      <p:sp>
+        <p:nvSpPr>
+          <p:cNvPr id="3" name="Title 2">
+            <a:extLst>
+              <a:ext uri="{FF2B5EF4-FFF2-40B4-BE49-F238E27FC236}">
+                <a16:creationId xmlns:a16="http://schemas.microsoft.com/office/drawing/2014/main" id="{8B2C5A3D-41EF-F0D7-D33D-0C7A4179DE93}"/>
+              </a:ext>
+            </a:extLst>
+          </p:cNvPr>
+          <p:cNvSpPr>
+            <a:spLocks noGrp="1"/>
+          </p:cNvSpPr>
+          <p:nvPr>
+            <p:ph type="title"/>
+          </p:nvPr>
+        </p:nvSpPr>
+        <p:spPr>
+          <a:xfrm>
+            <a:off x="594360" y="102875"/>
+            <a:ext cx="10873740" cy="773425"/>
+          </a:xfrm>
+        </p:spPr>
+        <p:txBody>
+          <a:bodyPr/>
+          <a:lstStyle/>
+          <a:p>
+            <a:r>
+              <a:rPr lang="en-US" sz="3600" dirty="0"/>
+              <a:t>4. EDA – Multivariate Analysis</a:t>
+            </a:r>
+          </a:p>
+        </p:txBody>
+      </p:sp>
+      <p:sp>
+        <p:nvSpPr>
+          <p:cNvPr id="15" name="TextBox 14">
+            <a:extLst>
+              <a:ext uri="{FF2B5EF4-FFF2-40B4-BE49-F238E27FC236}">
+                <a16:creationId xmlns:a16="http://schemas.microsoft.com/office/drawing/2014/main" id="{169B4790-4287-202C-CC86-DD3B85E4E980}"/>
+              </a:ext>
+            </a:extLst>
+          </p:cNvPr>
+          <p:cNvSpPr txBox="1"/>
+          <p:nvPr/>
+        </p:nvSpPr>
+        <p:spPr>
+          <a:xfrm>
+            <a:off x="7971132" y="1965535"/>
+            <a:ext cx="3971923" cy="3444020"/>
+          </a:xfrm>
+          <a:prstGeom prst="rect">
+            <a:avLst/>
+          </a:prstGeom>
+          <a:noFill/>
+          <a:ln>
+            <a:noFill/>
+          </a:ln>
+        </p:spPr>
+        <p:txBody>
+          <a:bodyPr wrap="square" rtlCol="0">
+            <a:spAutoFit/>
+          </a:bodyPr>
+          <a:lstStyle/>
+          <a:p>
+            <a:pPr>
+              <a:lnSpc>
+                <a:spcPct val="90000"/>
+              </a:lnSpc>
+              <a:spcBef>
+                <a:spcPts val="1800"/>
+              </a:spcBef>
+            </a:pPr>
+            <a:r>
+              <a:rPr lang="en-US" sz="1600" b="1" dirty="0">
+                <a:solidFill>
+                  <a:schemeClr val="bg1"/>
+                </a:solidFill>
+              </a:rPr>
+              <a:t>Key insights from the multivariate analysis using </a:t>
+            </a:r>
+            <a:r>
+              <a:rPr lang="en-US" sz="1600" b="1" dirty="0" err="1">
+                <a:solidFill>
+                  <a:schemeClr val="bg1"/>
+                </a:solidFill>
+              </a:rPr>
+              <a:t>Seaborn’s</a:t>
+            </a:r>
+            <a:r>
+              <a:rPr lang="en-US" sz="1600" b="1" dirty="0">
+                <a:solidFill>
+                  <a:schemeClr val="bg1"/>
+                </a:solidFill>
+              </a:rPr>
+              <a:t> </a:t>
+            </a:r>
+            <a:r>
+              <a:rPr lang="en-US" sz="1600" b="1" dirty="0" err="1">
+                <a:solidFill>
+                  <a:schemeClr val="bg1"/>
+                </a:solidFill>
+              </a:rPr>
+              <a:t>lineplot</a:t>
+            </a:r>
+            <a:r>
+              <a:rPr lang="en-US" sz="1600" b="1" dirty="0">
+                <a:solidFill>
+                  <a:schemeClr val="bg1"/>
+                </a:solidFill>
+              </a:rPr>
+              <a:t>,</a:t>
+            </a:r>
+          </a:p>
+          <a:p>
+            <a:pPr marL="285750" indent="-285750">
+              <a:lnSpc>
+                <a:spcPct val="90000"/>
+              </a:lnSpc>
+              <a:spcBef>
+                <a:spcPts val="1800"/>
+              </a:spcBef>
+              <a:buFont typeface="Arial" panose="020B0604020202020204" pitchFamily="34" charset="0"/>
+              <a:buChar char="•"/>
+            </a:pPr>
+            <a:r>
+              <a:rPr lang="en-US" sz="1600" dirty="0">
+                <a:solidFill>
+                  <a:schemeClr val="bg1"/>
+                </a:solidFill>
+              </a:rPr>
+              <a:t>There are fewer derogatory behavior from customers who has borrowed higher loan amount.</a:t>
+            </a:r>
+          </a:p>
+          <a:p>
+            <a:pPr marL="285750" indent="-285750">
+              <a:lnSpc>
+                <a:spcPct val="90000"/>
+              </a:lnSpc>
+              <a:spcBef>
+                <a:spcPts val="1800"/>
+              </a:spcBef>
+              <a:buFont typeface="Arial" panose="020B0604020202020204" pitchFamily="34" charset="0"/>
+              <a:buChar char="•"/>
+            </a:pPr>
+            <a:r>
+              <a:rPr lang="en-US" sz="1600" dirty="0">
+                <a:solidFill>
+                  <a:schemeClr val="bg1"/>
+                </a:solidFill>
+              </a:rPr>
+              <a:t>The density of derogatory behavior is vey high when the loan amount is less than $15,000/-</a:t>
+            </a:r>
+          </a:p>
+          <a:p>
+            <a:pPr marL="285750" indent="-285750">
+              <a:lnSpc>
+                <a:spcPct val="90000"/>
+              </a:lnSpc>
+              <a:spcBef>
+                <a:spcPts val="1800"/>
+              </a:spcBef>
+              <a:buFont typeface="Arial" panose="020B0604020202020204" pitchFamily="34" charset="0"/>
+              <a:buChar char="•"/>
+            </a:pPr>
+            <a:r>
+              <a:rPr lang="en-US" sz="1600" dirty="0">
+                <a:solidFill>
+                  <a:schemeClr val="bg1"/>
+                </a:solidFill>
+              </a:rPr>
+              <a:t>The loan amount is gradually increasing as the annual income, which reconfirms higher correlation between the two variables.</a:t>
+            </a:r>
+          </a:p>
+        </p:txBody>
+      </p:sp>
+      <p:sp>
+        <p:nvSpPr>
+          <p:cNvPr id="6" name="Title 2">
+            <a:extLst>
+              <a:ext uri="{FF2B5EF4-FFF2-40B4-BE49-F238E27FC236}">
+                <a16:creationId xmlns:a16="http://schemas.microsoft.com/office/drawing/2014/main" id="{C3E12C04-B5D0-1558-D5D1-5BDAE98AD77E}"/>
+              </a:ext>
+            </a:extLst>
+          </p:cNvPr>
+          <p:cNvSpPr txBox="1">
+            <a:spLocks/>
+          </p:cNvSpPr>
+          <p:nvPr/>
+        </p:nvSpPr>
+        <p:spPr>
+          <a:xfrm>
+            <a:off x="1012982" y="4334516"/>
+            <a:ext cx="6111240" cy="1014095"/>
+          </a:xfrm>
+          <a:prstGeom prst="rect">
+            <a:avLst/>
+          </a:prstGeom>
+        </p:spPr>
+        <p:txBody>
+          <a:bodyPr vert="horz" lIns="0" tIns="0" rIns="0" bIns="0" rtlCol="0" anchor="b" anchorCtr="0">
+            <a:noAutofit/>
+          </a:bodyPr>
+          <a:lstStyle>
+            <a:lvl1pPr algn="l" defTabSz="914400" rtl="0" eaLnBrk="1" latinLnBrk="0" hangingPunct="1">
+              <a:lnSpc>
+                <a:spcPct val="80000"/>
+              </a:lnSpc>
+              <a:spcBef>
+                <a:spcPct val="0"/>
+              </a:spcBef>
+              <a:buNone/>
+              <a:defRPr sz="4400" b="1" i="0" kern="1200" spc="100" baseline="0">
+                <a:solidFill>
+                  <a:schemeClr val="bg1"/>
+                </a:solidFill>
+                <a:latin typeface="+mj-lt"/>
+                <a:ea typeface="+mj-ea"/>
+                <a:cs typeface="+mj-cs"/>
+              </a:defRPr>
+            </a:lvl1pPr>
+            <a:lvl2pPr eaLnBrk="1" hangingPunct="1">
+              <a:defRPr>
+                <a:solidFill>
+                  <a:schemeClr val="tx2"/>
+                </a:solidFill>
+              </a:defRPr>
+            </a:lvl2pPr>
+            <a:lvl3pPr eaLnBrk="1" hangingPunct="1">
+              <a:defRPr>
+                <a:solidFill>
+                  <a:schemeClr val="tx2"/>
+                </a:solidFill>
+              </a:defRPr>
+            </a:lvl3pPr>
+            <a:lvl4pPr eaLnBrk="1" hangingPunct="1">
+              <a:defRPr>
+                <a:solidFill>
+                  <a:schemeClr val="tx2"/>
+                </a:solidFill>
+              </a:defRPr>
+            </a:lvl4pPr>
+            <a:lvl5pPr eaLnBrk="1" hangingPunct="1">
+              <a:defRPr>
+                <a:solidFill>
+                  <a:schemeClr val="tx2"/>
+                </a:solidFill>
+              </a:defRPr>
+            </a:lvl5pPr>
+            <a:lvl6pPr eaLnBrk="1" hangingPunct="1">
+              <a:defRPr>
+                <a:solidFill>
+                  <a:schemeClr val="tx2"/>
+                </a:solidFill>
+              </a:defRPr>
+            </a:lvl6pPr>
+            <a:lvl7pPr eaLnBrk="1" hangingPunct="1">
+              <a:defRPr>
+                <a:solidFill>
+                  <a:schemeClr val="tx2"/>
+                </a:solidFill>
+              </a:defRPr>
+            </a:lvl7pPr>
+            <a:lvl8pPr eaLnBrk="1" hangingPunct="1">
+              <a:defRPr>
+                <a:solidFill>
+                  <a:schemeClr val="tx2"/>
+                </a:solidFill>
+              </a:defRPr>
+            </a:lvl8pPr>
+            <a:lvl9pPr eaLnBrk="1" hangingPunct="1">
+              <a:defRPr>
+                <a:solidFill>
+                  <a:schemeClr val="tx2"/>
+                </a:solidFill>
+              </a:defRPr>
+            </a:lvl9pPr>
+          </a:lstStyle>
+          <a:p>
+            <a:r>
+              <a:rPr lang="en-US" sz="1200" u="sng" dirty="0">
+                <a:latin typeface="+mn-lt"/>
+              </a:rPr>
+              <a:t>Line plot legends:</a:t>
+            </a:r>
+          </a:p>
+          <a:p>
+            <a:endParaRPr lang="en-US" sz="1200" b="0" dirty="0">
+              <a:latin typeface="+mn-lt"/>
+            </a:endParaRPr>
+          </a:p>
+          <a:p>
+            <a:pPr marL="457200" indent="-457200">
+              <a:buAutoNum type="arabicPeriod"/>
+            </a:pPr>
+            <a:r>
+              <a:rPr lang="en-US" sz="1200" b="0" i="1" dirty="0">
+                <a:latin typeface="+mn-lt"/>
+              </a:rPr>
+              <a:t>Public Derogatory records are categorized to [‘Yes’, ‘No’] and indicated by [‘Blue’, ‘Orange’] line colors.</a:t>
+            </a:r>
+          </a:p>
+          <a:p>
+            <a:pPr marL="457200" indent="-457200">
+              <a:buAutoNum type="arabicPeriod"/>
+            </a:pPr>
+            <a:endParaRPr lang="en-US" sz="1200" b="0" i="1" dirty="0">
+              <a:latin typeface="+mn-lt"/>
+            </a:endParaRPr>
+          </a:p>
+          <a:p>
+            <a:pPr marL="457200" indent="-457200">
+              <a:buAutoNum type="arabicPeriod"/>
+            </a:pPr>
+            <a:r>
+              <a:rPr lang="en-US" sz="1200" b="0" i="1" dirty="0">
+                <a:latin typeface="+mn-lt"/>
+              </a:rPr>
+              <a:t>Loan Term is indicated by the thickness of the lines.</a:t>
+            </a:r>
+          </a:p>
+        </p:txBody>
+      </p:sp>
+      <p:pic>
+        <p:nvPicPr>
+          <p:cNvPr id="5" name="Picture 4">
+            <a:extLst>
+              <a:ext uri="{FF2B5EF4-FFF2-40B4-BE49-F238E27FC236}">
+                <a16:creationId xmlns:a16="http://schemas.microsoft.com/office/drawing/2014/main" id="{98B0894D-B969-CBF8-395B-3EBEAD8362AF}"/>
+              </a:ext>
+            </a:extLst>
+          </p:cNvPr>
+          <p:cNvPicPr>
+            <a:picLocks noChangeAspect="1"/>
+          </p:cNvPicPr>
+          <p:nvPr/>
+        </p:nvPicPr>
+        <p:blipFill>
+          <a:blip r:embed="rId3"/>
+          <a:stretch>
+            <a:fillRect/>
+          </a:stretch>
+        </p:blipFill>
+        <p:spPr>
+          <a:xfrm>
+            <a:off x="248945" y="1965535"/>
+            <a:ext cx="7553854" cy="2293841"/>
+          </a:xfrm>
+          <a:prstGeom prst="rect">
+            <a:avLst/>
+          </a:prstGeom>
+        </p:spPr>
+      </p:pic>
+    </p:spTree>
+    <p:extLst>
+      <p:ext uri="{BB962C8B-B14F-4D97-AF65-F5344CB8AC3E}">
+        <p14:creationId xmlns:p14="http://schemas.microsoft.com/office/powerpoint/2010/main" val="1463984363"/>
+      </p:ext>
+    </p:extLst>
+  </p:cSld>
+  <p:clrMapOvr>
+    <a:masterClrMapping/>
+  </p:clrMapOvr>
+</p:sld>
+</file>
+
+<file path=ppt/slides/slide14.xml><?xml version="1.0" encoding="utf-8"?>
+<p:sld xmlns:a="http://schemas.openxmlformats.org/drawingml/2006/main" xmlns:r="http://schemas.openxmlformats.org/officeDocument/2006/relationships" xmlns:p="http://schemas.openxmlformats.org/presentationml/2006/main">
+  <p:cSld>
+    <p:spTree>
+      <p:nvGrpSpPr>
+        <p:cNvPr id="1" name="">
+          <a:extLst>
+            <a:ext uri="{FF2B5EF4-FFF2-40B4-BE49-F238E27FC236}">
+              <a16:creationId xmlns:a16="http://schemas.microsoft.com/office/drawing/2014/main" id="{7AB8CA51-A72D-C1ED-122B-8175D199B81F}"/>
+            </a:ext>
+          </a:extLst>
+        </p:cNvPr>
+        <p:cNvGrpSpPr/>
+        <p:nvPr/>
+      </p:nvGrpSpPr>
+      <p:grpSpPr>
+        <a:xfrm>
+          <a:off x="0" y="0"/>
+          <a:ext cx="0" cy="0"/>
+          <a:chOff x="0" y="0"/>
+          <a:chExt cx="0" cy="0"/>
+        </a:xfrm>
+      </p:grpSpPr>
+      <p:sp>
+        <p:nvSpPr>
+          <p:cNvPr id="3" name="Title 2">
+            <a:extLst>
+              <a:ext uri="{FF2B5EF4-FFF2-40B4-BE49-F238E27FC236}">
+                <a16:creationId xmlns:a16="http://schemas.microsoft.com/office/drawing/2014/main" id="{268BFB75-CE22-E844-8704-917452B4F216}"/>
+              </a:ext>
+            </a:extLst>
+          </p:cNvPr>
+          <p:cNvSpPr>
+            <a:spLocks noGrp="1"/>
+          </p:cNvSpPr>
+          <p:nvPr>
+            <p:ph type="title"/>
+          </p:nvPr>
+        </p:nvSpPr>
+        <p:spPr>
+          <a:xfrm>
+            <a:off x="594360" y="102875"/>
+            <a:ext cx="10873740" cy="773425"/>
+          </a:xfrm>
+        </p:spPr>
+        <p:txBody>
+          <a:bodyPr/>
+          <a:lstStyle/>
+          <a:p>
+            <a:r>
+              <a:rPr lang="en-US" sz="3600" dirty="0"/>
+              <a:t>4. EDA – Multivariate Analysis</a:t>
+            </a:r>
+          </a:p>
+        </p:txBody>
+      </p:sp>
+      <p:sp>
+        <p:nvSpPr>
+          <p:cNvPr id="15" name="TextBox 14">
+            <a:extLst>
+              <a:ext uri="{FF2B5EF4-FFF2-40B4-BE49-F238E27FC236}">
+                <a16:creationId xmlns:a16="http://schemas.microsoft.com/office/drawing/2014/main" id="{9E0E9608-3AF0-32EB-2955-4375B87BE110}"/>
+              </a:ext>
+            </a:extLst>
+          </p:cNvPr>
+          <p:cNvSpPr txBox="1"/>
+          <p:nvPr/>
+        </p:nvSpPr>
+        <p:spPr>
+          <a:xfrm>
+            <a:off x="7971132" y="1965535"/>
+            <a:ext cx="3971923" cy="313932"/>
+          </a:xfrm>
+          <a:prstGeom prst="rect">
+            <a:avLst/>
+          </a:prstGeom>
+          <a:noFill/>
+          <a:ln>
+            <a:noFill/>
+          </a:ln>
+        </p:spPr>
+        <p:txBody>
+          <a:bodyPr wrap="square" rtlCol="0">
+            <a:spAutoFit/>
+          </a:bodyPr>
+          <a:lstStyle/>
+          <a:p>
+            <a:pPr>
+              <a:lnSpc>
+                <a:spcPct val="90000"/>
+              </a:lnSpc>
+              <a:spcBef>
+                <a:spcPts val="1800"/>
+              </a:spcBef>
+            </a:pPr>
+            <a:r>
+              <a:rPr lang="en-US" sz="1600" b="1" dirty="0">
+                <a:solidFill>
+                  <a:schemeClr val="bg1"/>
+                </a:solidFill>
+              </a:rPr>
+              <a:t>To-Do</a:t>
+            </a:r>
+            <a:endParaRPr lang="en-US" sz="1600" dirty="0">
+              <a:solidFill>
+                <a:schemeClr val="bg1"/>
+              </a:solidFill>
+            </a:endParaRPr>
+          </a:p>
+        </p:txBody>
+      </p:sp>
+      <p:pic>
+        <p:nvPicPr>
+          <p:cNvPr id="4" name="Picture 3">
+            <a:extLst>
+              <a:ext uri="{FF2B5EF4-FFF2-40B4-BE49-F238E27FC236}">
+                <a16:creationId xmlns:a16="http://schemas.microsoft.com/office/drawing/2014/main" id="{83555CE0-600E-5A81-8E67-F966DFF74EBD}"/>
+              </a:ext>
+            </a:extLst>
+          </p:cNvPr>
+          <p:cNvPicPr>
+            <a:picLocks noChangeAspect="1"/>
+          </p:cNvPicPr>
+          <p:nvPr/>
+        </p:nvPicPr>
+        <p:blipFill>
+          <a:blip r:embed="rId3"/>
+          <a:stretch>
+            <a:fillRect/>
+          </a:stretch>
+        </p:blipFill>
+        <p:spPr>
+          <a:xfrm>
+            <a:off x="151730" y="1304290"/>
+            <a:ext cx="7819402" cy="2344247"/>
+          </a:xfrm>
+          <a:prstGeom prst="rect">
+            <a:avLst/>
+          </a:prstGeom>
+        </p:spPr>
+      </p:pic>
+      <p:pic>
+        <p:nvPicPr>
+          <p:cNvPr id="8" name="Picture 7">
+            <a:extLst>
+              <a:ext uri="{FF2B5EF4-FFF2-40B4-BE49-F238E27FC236}">
+                <a16:creationId xmlns:a16="http://schemas.microsoft.com/office/drawing/2014/main" id="{360119AE-505F-EC99-EF74-05AE40E6E8AD}"/>
+              </a:ext>
+            </a:extLst>
+          </p:cNvPr>
+          <p:cNvPicPr>
+            <a:picLocks noChangeAspect="1"/>
+          </p:cNvPicPr>
+          <p:nvPr/>
+        </p:nvPicPr>
+        <p:blipFill>
+          <a:blip r:embed="rId4"/>
+          <a:stretch>
+            <a:fillRect/>
+          </a:stretch>
+        </p:blipFill>
+        <p:spPr>
+          <a:xfrm>
+            <a:off x="151731" y="3947871"/>
+            <a:ext cx="7819402" cy="2345820"/>
+          </a:xfrm>
+          <a:prstGeom prst="rect">
+            <a:avLst/>
+          </a:prstGeom>
+        </p:spPr>
+      </p:pic>
+    </p:spTree>
+    <p:extLst>
+      <p:ext uri="{BB962C8B-B14F-4D97-AF65-F5344CB8AC3E}">
+        <p14:creationId xmlns:p14="http://schemas.microsoft.com/office/powerpoint/2010/main" val="2691305824"/>
+      </p:ext>
+    </p:extLst>
+  </p:cSld>
+  <p:clrMapOvr>
+    <a:masterClrMapping/>
+  </p:clrMapOvr>
+</p:sld>
+</file>
+
+<file path=ppt/slides/slide15.xml><?xml version="1.0" encoding="utf-8"?>
+<p:sld xmlns:a="http://schemas.openxmlformats.org/drawingml/2006/main" xmlns:r="http://schemas.openxmlformats.org/officeDocument/2006/relationships" xmlns:p="http://schemas.openxmlformats.org/presentationml/2006/main">
+  <p:cSld>
+    <p:spTree>
+      <p:nvGrpSpPr>
+        <p:cNvPr id="1" name="">
+          <a:extLst>
+            <a:ext uri="{FF2B5EF4-FFF2-40B4-BE49-F238E27FC236}">
+              <a16:creationId xmlns:a16="http://schemas.microsoft.com/office/drawing/2014/main" id="{AECD7D97-4EC2-D62F-97E1-0E9F436F439F}"/>
+            </a:ext>
+          </a:extLst>
+        </p:cNvPr>
+        <p:cNvGrpSpPr/>
+        <p:nvPr/>
+      </p:nvGrpSpPr>
+      <p:grpSpPr>
+        <a:xfrm>
+          <a:off x="0" y="0"/>
+          <a:ext cx="0" cy="0"/>
+          <a:chOff x="0" y="0"/>
+          <a:chExt cx="0" cy="0"/>
+        </a:xfrm>
+      </p:grpSpPr>
+      <p:sp>
+        <p:nvSpPr>
+          <p:cNvPr id="3" name="Title 2">
+            <a:extLst>
+              <a:ext uri="{FF2B5EF4-FFF2-40B4-BE49-F238E27FC236}">
+                <a16:creationId xmlns:a16="http://schemas.microsoft.com/office/drawing/2014/main" id="{46D865F5-F50C-C189-8893-7689D929D3A0}"/>
+              </a:ext>
+            </a:extLst>
+          </p:cNvPr>
+          <p:cNvSpPr>
+            <a:spLocks noGrp="1"/>
+          </p:cNvSpPr>
+          <p:nvPr>
+            <p:ph type="title"/>
+          </p:nvPr>
+        </p:nvSpPr>
+        <p:spPr>
+          <a:xfrm>
+            <a:off x="594360" y="102875"/>
+            <a:ext cx="10873740" cy="773425"/>
+          </a:xfrm>
+        </p:spPr>
+        <p:txBody>
+          <a:bodyPr/>
+          <a:lstStyle/>
+          <a:p>
+            <a:r>
+              <a:rPr lang="en-US" sz="3600" dirty="0"/>
+              <a:t>4. EDA – Multivariate Analysis</a:t>
+            </a:r>
+          </a:p>
+        </p:txBody>
+      </p:sp>
+      <p:pic>
+        <p:nvPicPr>
+          <p:cNvPr id="5" name="Picture 4">
+            <a:extLst>
+              <a:ext uri="{FF2B5EF4-FFF2-40B4-BE49-F238E27FC236}">
+                <a16:creationId xmlns:a16="http://schemas.microsoft.com/office/drawing/2014/main" id="{DA17F847-B5E7-6C89-423D-BB057459649B}"/>
+              </a:ext>
+            </a:extLst>
+          </p:cNvPr>
+          <p:cNvPicPr>
+            <a:picLocks noChangeAspect="1"/>
+          </p:cNvPicPr>
+          <p:nvPr/>
+        </p:nvPicPr>
+        <p:blipFill>
+          <a:blip r:embed="rId3"/>
+          <a:stretch>
+            <a:fillRect/>
+          </a:stretch>
+        </p:blipFill>
+        <p:spPr>
+          <a:xfrm>
+            <a:off x="935052" y="3312778"/>
+            <a:ext cx="10321895" cy="3096568"/>
+          </a:xfrm>
+          <a:prstGeom prst="rect">
+            <a:avLst/>
+          </a:prstGeom>
+        </p:spPr>
+      </p:pic>
+      <p:sp>
+        <p:nvSpPr>
+          <p:cNvPr id="6" name="Title 2">
+            <a:extLst>
+              <a:ext uri="{FF2B5EF4-FFF2-40B4-BE49-F238E27FC236}">
+                <a16:creationId xmlns:a16="http://schemas.microsoft.com/office/drawing/2014/main" id="{4666D051-A36A-8AFB-B064-B57F95478905}"/>
+              </a:ext>
+            </a:extLst>
+          </p:cNvPr>
+          <p:cNvSpPr txBox="1">
+            <a:spLocks/>
+          </p:cNvSpPr>
+          <p:nvPr/>
+        </p:nvSpPr>
+        <p:spPr>
+          <a:xfrm>
+            <a:off x="659129" y="1571328"/>
+            <a:ext cx="10873740" cy="773425"/>
+          </a:xfrm>
+          <a:prstGeom prst="rect">
+            <a:avLst/>
+          </a:prstGeom>
+        </p:spPr>
+        <p:txBody>
+          <a:bodyPr vert="horz" lIns="0" tIns="0" rIns="0" bIns="0" rtlCol="0" anchor="b" anchorCtr="0">
+            <a:noAutofit/>
+          </a:bodyPr>
+          <a:lstStyle>
+            <a:lvl1pPr algn="l" defTabSz="914400" rtl="0" eaLnBrk="1" latinLnBrk="0" hangingPunct="1">
+              <a:lnSpc>
+                <a:spcPct val="80000"/>
+              </a:lnSpc>
+              <a:spcBef>
+                <a:spcPct val="0"/>
+              </a:spcBef>
+              <a:buNone/>
+              <a:defRPr sz="4400" b="1" i="0" kern="1200" spc="100" baseline="0">
+                <a:solidFill>
+                  <a:schemeClr val="bg1"/>
+                </a:solidFill>
+                <a:latin typeface="+mj-lt"/>
+                <a:ea typeface="+mj-ea"/>
+                <a:cs typeface="+mj-cs"/>
+              </a:defRPr>
+            </a:lvl1pPr>
+            <a:lvl2pPr eaLnBrk="1" hangingPunct="1">
+              <a:defRPr>
+                <a:solidFill>
+                  <a:schemeClr val="tx2"/>
+                </a:solidFill>
+              </a:defRPr>
+            </a:lvl2pPr>
+            <a:lvl3pPr eaLnBrk="1" hangingPunct="1">
+              <a:defRPr>
+                <a:solidFill>
+                  <a:schemeClr val="tx2"/>
+                </a:solidFill>
+              </a:defRPr>
+            </a:lvl3pPr>
+            <a:lvl4pPr eaLnBrk="1" hangingPunct="1">
+              <a:defRPr>
+                <a:solidFill>
+                  <a:schemeClr val="tx2"/>
+                </a:solidFill>
+              </a:defRPr>
+            </a:lvl4pPr>
+            <a:lvl5pPr eaLnBrk="1" hangingPunct="1">
+              <a:defRPr>
+                <a:solidFill>
+                  <a:schemeClr val="tx2"/>
+                </a:solidFill>
+              </a:defRPr>
+            </a:lvl5pPr>
+            <a:lvl6pPr eaLnBrk="1" hangingPunct="1">
+              <a:defRPr>
+                <a:solidFill>
+                  <a:schemeClr val="tx2"/>
+                </a:solidFill>
+              </a:defRPr>
+            </a:lvl6pPr>
+            <a:lvl7pPr eaLnBrk="1" hangingPunct="1">
+              <a:defRPr>
+                <a:solidFill>
+                  <a:schemeClr val="tx2"/>
+                </a:solidFill>
+              </a:defRPr>
+            </a:lvl7pPr>
+            <a:lvl8pPr eaLnBrk="1" hangingPunct="1">
+              <a:defRPr>
+                <a:solidFill>
+                  <a:schemeClr val="tx2"/>
+                </a:solidFill>
+              </a:defRPr>
+            </a:lvl8pPr>
+            <a:lvl9pPr eaLnBrk="1" hangingPunct="1">
+              <a:defRPr>
+                <a:solidFill>
+                  <a:schemeClr val="tx2"/>
+                </a:solidFill>
+              </a:defRPr>
+            </a:lvl9pPr>
+          </a:lstStyle>
+          <a:p>
+            <a:r>
+              <a:rPr lang="en-US" sz="1600" b="0" dirty="0">
+                <a:latin typeface="+mn-lt"/>
+              </a:rPr>
+              <a:t>To-Do</a:t>
+            </a:r>
+          </a:p>
+        </p:txBody>
+      </p:sp>
+    </p:spTree>
+    <p:extLst>
+      <p:ext uri="{BB962C8B-B14F-4D97-AF65-F5344CB8AC3E}">
+        <p14:creationId xmlns:p14="http://schemas.microsoft.com/office/powerpoint/2010/main" val="2799719589"/>
+      </p:ext>
+    </p:extLst>
+  </p:cSld>
+  <p:clrMapOvr>
+    <a:masterClrMapping/>
+  </p:clrMapOvr>
+</p:sld>
+</file>
+
+<file path=ppt/slides/slide16.xml><?xml version="1.0" encoding="utf-8"?>
 <p:sld xmlns:a="http://schemas.openxmlformats.org/drawingml/2006/main" xmlns:r="http://schemas.openxmlformats.org/officeDocument/2006/relationships" xmlns:p="http://schemas.openxmlformats.org/presentationml/2006/main">
   <p:cSld>
     <p:spTree>
@@ -15671,6 +17439,15 @@
 </file>
 
 <file path=customXml/item1.xml><?xml version="1.0" encoding="utf-8"?>
+<?mso-contentType ?>
+<FormTemplates xmlns="http://schemas.microsoft.com/sharepoint/v3/contenttype/forms">
+  <Display>DocumentLibraryForm</Display>
+  <Edit>DocumentLibraryForm</Edit>
+  <New>DocumentLibraryForm</New>
+</FormTemplates>
+</file>
+
+<file path=customXml/item2.xml><?xml version="1.0" encoding="utf-8"?>
 <p:properties xmlns:p="http://schemas.microsoft.com/office/2006/metadata/properties" xmlns:xsi="http://www.w3.org/2001/XMLSchema-instance" xmlns:pc="http://schemas.microsoft.com/office/infopath/2007/PartnerControls">
   <documentManagement>
     <Background xmlns="71af3243-3dd4-4a8d-8c0d-dd76da1f02a5">false</Background>
@@ -15688,15 +17465,6 @@
     <MediaServiceKeyPoints xmlns="71af3243-3dd4-4a8d-8c0d-dd76da1f02a5" xsi:nil="true"/>
   </documentManagement>
 </p:properties>
-</file>
-
-<file path=customXml/item2.xml><?xml version="1.0" encoding="utf-8"?>
-<?mso-contentType ?>
-<FormTemplates xmlns="http://schemas.microsoft.com/sharepoint/v3/contenttype/forms">
-  <Display>DocumentLibraryForm</Display>
-  <Edit>DocumentLibraryForm</Edit>
-  <New>DocumentLibraryForm</New>
-</FormTemplates>
 </file>
 
 <file path=customXml/item3.xml><?xml version="1.0" encoding="utf-8"?>
@@ -16012,6 +17780,14 @@
 </file>
 
 <file path=customXml/itemProps1.xml><?xml version="1.0" encoding="utf-8"?>
+<ds:datastoreItem xmlns:ds="http://schemas.openxmlformats.org/officeDocument/2006/customXml" ds:itemID="{C21FFAC0-05A2-416A-B06C-C248395482CF}">
+  <ds:schemaRefs>
+    <ds:schemaRef ds:uri="http://schemas.microsoft.com/sharepoint/v3/contenttype/forms"/>
+  </ds:schemaRefs>
+</ds:datastoreItem>
+</file>
+
+<file path=customXml/itemProps2.xml><?xml version="1.0" encoding="utf-8"?>
 <ds:datastoreItem xmlns:ds="http://schemas.openxmlformats.org/officeDocument/2006/customXml" ds:itemID="{4F4B194E-8B30-4377-8C59-ECFB902D2A26}">
   <ds:schemaRefs>
     <ds:schemaRef ds:uri="http://schemas.microsoft.com/office/2006/metadata/properties"/>
@@ -16019,14 +17795,6 @@
     <ds:schemaRef ds:uri="71af3243-3dd4-4a8d-8c0d-dd76da1f02a5"/>
     <ds:schemaRef ds:uri="http://schemas.microsoft.com/sharepoint/v3"/>
     <ds:schemaRef ds:uri="230e9df3-be65-4c73-a93b-d1236ebd677e"/>
-  </ds:schemaRefs>
-</ds:datastoreItem>
-</file>
-
-<file path=customXml/itemProps2.xml><?xml version="1.0" encoding="utf-8"?>
-<ds:datastoreItem xmlns:ds="http://schemas.openxmlformats.org/officeDocument/2006/customXml" ds:itemID="{C21FFAC0-05A2-416A-B06C-C248395482CF}">
-  <ds:schemaRefs>
-    <ds:schemaRef ds:uri="http://schemas.microsoft.com/sharepoint/v3/contenttype/forms"/>
   </ds:schemaRefs>
 </ds:datastoreItem>
 </file>

</xml_diff>

<commit_message>
Updated the python Added readme file Updated pptx file
</commit_message>
<xml_diff>
--- a/UvarajThulasiram.pptx
+++ b/UvarajThulasiram.pptx
@@ -5,10 +5,10 @@
     <p:sldMasterId id="2147483658" r:id="rId4"/>
   </p:sldMasterIdLst>
   <p:notesMasterIdLst>
-    <p:notesMasterId r:id="rId21"/>
+    <p:notesMasterId r:id="rId22"/>
   </p:notesMasterIdLst>
   <p:handoutMasterIdLst>
-    <p:handoutMasterId r:id="rId22"/>
+    <p:handoutMasterId r:id="rId23"/>
   </p:handoutMasterIdLst>
   <p:sldIdLst>
     <p:sldId id="410" r:id="rId5"/>
@@ -26,7 +26,8 @@
     <p:sldId id="420" r:id="rId17"/>
     <p:sldId id="421" r:id="rId18"/>
     <p:sldId id="422" r:id="rId19"/>
-    <p:sldId id="398" r:id="rId20"/>
+    <p:sldId id="423" r:id="rId20"/>
+    <p:sldId id="398" r:id="rId21"/>
   </p:sldIdLst>
   <p:sldSz cx="12192000" cy="6858000"/>
   <p:notesSz cx="6858000" cy="9144000"/>
@@ -1423,6 +1424,114 @@
   <p:cSld>
     <p:spTree>
       <p:nvGrpSpPr>
+        <p:cNvPr id="1" name="">
+          <a:extLst>
+            <a:ext uri="{FF2B5EF4-FFF2-40B4-BE49-F238E27FC236}">
+              <a16:creationId xmlns:a16="http://schemas.microsoft.com/office/drawing/2014/main" id="{732A43C6-36FB-0ECA-E11A-7C39590A1DB9}"/>
+            </a:ext>
+          </a:extLst>
+        </p:cNvPr>
+        <p:cNvGrpSpPr/>
+        <p:nvPr/>
+      </p:nvGrpSpPr>
+      <p:grpSpPr>
+        <a:xfrm>
+          <a:off x="0" y="0"/>
+          <a:ext cx="0" cy="0"/>
+          <a:chOff x="0" y="0"/>
+          <a:chExt cx="0" cy="0"/>
+        </a:xfrm>
+      </p:grpSpPr>
+      <p:sp>
+        <p:nvSpPr>
+          <p:cNvPr id="2" name="Slide Image Placeholder 1">
+            <a:extLst>
+              <a:ext uri="{FF2B5EF4-FFF2-40B4-BE49-F238E27FC236}">
+                <a16:creationId xmlns:a16="http://schemas.microsoft.com/office/drawing/2014/main" id="{72D662CE-C842-48D5-85C9-881D73655322}"/>
+              </a:ext>
+            </a:extLst>
+          </p:cNvPr>
+          <p:cNvSpPr>
+            <a:spLocks noGrp="1" noRot="1" noChangeAspect="1"/>
+          </p:cNvSpPr>
+          <p:nvPr>
+            <p:ph type="sldImg"/>
+          </p:nvPr>
+        </p:nvSpPr>
+        <p:spPr/>
+      </p:sp>
+      <p:sp>
+        <p:nvSpPr>
+          <p:cNvPr id="3" name="Notes Placeholder 2">
+            <a:extLst>
+              <a:ext uri="{FF2B5EF4-FFF2-40B4-BE49-F238E27FC236}">
+                <a16:creationId xmlns:a16="http://schemas.microsoft.com/office/drawing/2014/main" id="{6D347C2A-B585-5CEC-31F7-337599C0E125}"/>
+              </a:ext>
+            </a:extLst>
+          </p:cNvPr>
+          <p:cNvSpPr>
+            <a:spLocks noGrp="1"/>
+          </p:cNvSpPr>
+          <p:nvPr>
+            <p:ph type="body" idx="1"/>
+          </p:nvPr>
+        </p:nvSpPr>
+        <p:spPr/>
+        <p:txBody>
+          <a:bodyPr/>
+          <a:lstStyle/>
+          <a:p>
+            <a:endParaRPr lang="en-US" dirty="0"/>
+          </a:p>
+        </p:txBody>
+      </p:sp>
+      <p:sp>
+        <p:nvSpPr>
+          <p:cNvPr id="4" name="Slide Number Placeholder 3">
+            <a:extLst>
+              <a:ext uri="{FF2B5EF4-FFF2-40B4-BE49-F238E27FC236}">
+                <a16:creationId xmlns:a16="http://schemas.microsoft.com/office/drawing/2014/main" id="{5CE51A72-E978-F5C8-4AE6-82278E462152}"/>
+              </a:ext>
+            </a:extLst>
+          </p:cNvPr>
+          <p:cNvSpPr>
+            <a:spLocks noGrp="1"/>
+          </p:cNvSpPr>
+          <p:nvPr>
+            <p:ph type="sldNum" sz="quarter" idx="5"/>
+          </p:nvPr>
+        </p:nvSpPr>
+        <p:spPr/>
+        <p:txBody>
+          <a:bodyPr/>
+          <a:lstStyle/>
+          <a:p>
+            <a:fld id="{A89C7E07-3C67-C64C-8DA0-0404F6303970}" type="slidenum">
+              <a:rPr lang="en-US" smtClean="0"/>
+              <a:t>16</a:t>
+            </a:fld>
+            <a:endParaRPr lang="en-US" dirty="0"/>
+          </a:p>
+        </p:txBody>
+      </p:sp>
+    </p:spTree>
+    <p:extLst>
+      <p:ext uri="{BB962C8B-B14F-4D97-AF65-F5344CB8AC3E}">
+        <p14:creationId xmlns:p14="http://schemas.microsoft.com/office/powerpoint/2010/main" val="959460246"/>
+      </p:ext>
+    </p:extLst>
+  </p:cSld>
+  <p:clrMapOvr>
+    <a:masterClrMapping/>
+  </p:clrMapOvr>
+</p:notes>
+</file>
+
+<file path=ppt/notesSlides/notesSlide17.xml><?xml version="1.0" encoding="utf-8"?>
+<p:notes xmlns:a="http://schemas.openxmlformats.org/drawingml/2006/main" xmlns:r="http://schemas.openxmlformats.org/officeDocument/2006/relationships" xmlns:p="http://schemas.openxmlformats.org/presentationml/2006/main">
+  <p:cSld>
+    <p:spTree>
+      <p:nvGrpSpPr>
         <p:cNvPr id="1" name=""/>
         <p:cNvGrpSpPr/>
         <p:nvPr/>
@@ -1483,7 +1592,7 @@
           <a:p>
             <a:fld id="{A89C7E07-3C67-C64C-8DA0-0404F6303970}" type="slidenum">
               <a:rPr lang="en-US" smtClean="0"/>
-              <a:t>16</a:t>
+              <a:t>17</a:t>
             </a:fld>
             <a:endParaRPr lang="en-US" dirty="0"/>
           </a:p>
@@ -11117,6 +11226,45 @@
           </a:prstGeom>
         </p:spPr>
       </p:pic>
+      <p:cxnSp>
+        <p:nvCxnSpPr>
+          <p:cNvPr id="4" name="Straight Arrow Connector 3">
+            <a:extLst>
+              <a:ext uri="{FF2B5EF4-FFF2-40B4-BE49-F238E27FC236}">
+                <a16:creationId xmlns:a16="http://schemas.microsoft.com/office/drawing/2014/main" id="{22EBAF3C-6C11-A442-8532-AF624A3F77CE}"/>
+              </a:ext>
+            </a:extLst>
+          </p:cNvPr>
+          <p:cNvCxnSpPr/>
+          <p:nvPr/>
+        </p:nvCxnSpPr>
+        <p:spPr>
+          <a:xfrm flipV="1">
+            <a:off x="4683095" y="2281727"/>
+            <a:ext cx="7033189" cy="675118"/>
+          </a:xfrm>
+          <a:prstGeom prst="straightConnector1">
+            <a:avLst/>
+          </a:prstGeom>
+          <a:ln>
+            <a:tailEnd type="triangle"/>
+          </a:ln>
+        </p:spPr>
+        <p:style>
+          <a:lnRef idx="1">
+            <a:schemeClr val="dk1"/>
+          </a:lnRef>
+          <a:fillRef idx="0">
+            <a:schemeClr val="dk1"/>
+          </a:fillRef>
+          <a:effectRef idx="0">
+            <a:schemeClr val="dk1"/>
+          </a:effectRef>
+          <a:fontRef idx="minor">
+            <a:schemeClr val="tx1"/>
+          </a:fontRef>
+        </p:style>
+      </p:cxnSp>
     </p:spTree>
     <p:extLst>
       <p:ext uri="{BB962C8B-B14F-4D97-AF65-F5344CB8AC3E}">
@@ -11821,7 +11969,7 @@
                   <a:schemeClr val="bg1"/>
                 </a:solidFill>
               </a:rPr>
-              <a:t>The density of derogatory behavior is vey high when the loan amount is less than $15,000/-</a:t>
+              <a:t>The density of derogatory behavior is very high when the loan amount is less than $15,000/-</a:t>
             </a:r>
           </a:p>
           <a:p>
@@ -12106,8 +12254,8 @@
         </p:nvSpPr>
         <p:spPr>
           <a:xfrm>
-            <a:off x="7971132" y="1965535"/>
-            <a:ext cx="3971923" cy="313932"/>
+            <a:off x="7971132" y="1815727"/>
+            <a:ext cx="3971923" cy="3665619"/>
           </a:xfrm>
           <a:prstGeom prst="rect">
             <a:avLst/>
@@ -12137,13 +12285,97 @@
                   <a:schemeClr val="bg1"/>
                 </a:solidFill>
               </a:rPr>
-              <a:t>To-Do</a:t>
-            </a:r>
-            <a:endParaRPr lang="en-US" sz="1600" dirty="0">
+              <a:t>Insights from multivariate analysis using </a:t>
+            </a:r>
+            <a:r>
+              <a:rPr lang="en-US" sz="1600" b="1" dirty="0" err="1">
+                <a:solidFill>
+                  <a:schemeClr val="bg1"/>
+                </a:solidFill>
+              </a:rPr>
+              <a:t>Seaborn’s</a:t>
+            </a:r>
+            <a:r>
+              <a:rPr lang="en-US" sz="1600" b="1" dirty="0">
+                <a:solidFill>
+                  <a:schemeClr val="bg1"/>
+                </a:solidFill>
+              </a:rPr>
+              <a:t> </a:t>
+            </a:r>
+            <a:r>
+              <a:rPr lang="en-US" sz="1600" b="1" dirty="0" err="1">
+                <a:solidFill>
+                  <a:schemeClr val="bg1"/>
+                </a:solidFill>
+              </a:rPr>
+              <a:t>catplot</a:t>
+            </a:r>
+            <a:endParaRPr lang="en-US" sz="1600" b="1" dirty="0">
               <a:solidFill>
                 <a:schemeClr val="bg1"/>
               </a:solidFill>
             </a:endParaRPr>
+          </a:p>
+          <a:p>
+            <a:pPr marL="285750" indent="-285750">
+              <a:lnSpc>
+                <a:spcPct val="90000"/>
+              </a:lnSpc>
+              <a:spcBef>
+                <a:spcPts val="1800"/>
+              </a:spcBef>
+              <a:buFont typeface="Arial" panose="020B0604020202020204" pitchFamily="34" charset="0"/>
+              <a:buChar char="•"/>
+            </a:pPr>
+            <a:r>
+              <a:rPr lang="en-US" sz="1600" dirty="0">
+                <a:solidFill>
+                  <a:schemeClr val="bg1"/>
+                </a:solidFill>
+              </a:rPr>
+              <a:t>Long term loan amounts are relatively higher compared to short term loan amounts across all grades</a:t>
+            </a:r>
+          </a:p>
+          <a:p>
+            <a:pPr marL="285750" indent="-285750">
+              <a:lnSpc>
+                <a:spcPct val="90000"/>
+              </a:lnSpc>
+              <a:spcBef>
+                <a:spcPts val="1800"/>
+              </a:spcBef>
+              <a:buFont typeface="Arial" panose="020B0604020202020204" pitchFamily="34" charset="0"/>
+              <a:buChar char="•"/>
+            </a:pPr>
+            <a:r>
+              <a:rPr lang="en-US" sz="1600" dirty="0">
+                <a:solidFill>
+                  <a:schemeClr val="bg1"/>
+                </a:solidFill>
+              </a:rPr>
+              <a:t>Long term loans fetch more interest than short term loans across all employee lengths.</a:t>
+            </a:r>
+          </a:p>
+          <a:p>
+            <a:pPr marL="285750" indent="-285750">
+              <a:lnSpc>
+                <a:spcPct val="90000"/>
+              </a:lnSpc>
+              <a:spcBef>
+                <a:spcPts val="1800"/>
+              </a:spcBef>
+              <a:buFont typeface="Arial" panose="020B0604020202020204" pitchFamily="34" charset="0"/>
+              <a:buChar char="•"/>
+            </a:pPr>
+            <a:r>
+              <a:rPr lang="en-US" sz="1600" dirty="0">
+                <a:solidFill>
+                  <a:schemeClr val="bg1"/>
+                </a:solidFill>
+              </a:rPr>
+              <a:t>Hence offering long term loans will be more profitable and as well have less burden on the customer as the installment amount is inversely proportional to the loan term</a:t>
+            </a:r>
           </a:p>
         </p:txBody>
       </p:sp>
@@ -12322,8 +12554,8 @@
         </p:nvSpPr>
         <p:spPr>
           <a:xfrm>
-            <a:off x="659129" y="1571328"/>
-            <a:ext cx="10873740" cy="773425"/>
+            <a:off x="594360" y="1282139"/>
+            <a:ext cx="7707204" cy="1624799"/>
           </a:xfrm>
           <a:prstGeom prst="rect">
             <a:avLst/>
@@ -12413,7 +12645,24 @@
               <a:rPr lang="en-US" sz="1600" b="0" dirty="0">
                 <a:latin typeface="+mn-lt"/>
               </a:rPr>
-              <a:t>To-Do</a:t>
+              <a:t>Comparing the annual income against the category of open credit lines based on the loan term gives the following insights,</a:t>
+            </a:r>
+          </a:p>
+          <a:p>
+            <a:endParaRPr lang="en-US" sz="1600" b="0" dirty="0">
+              <a:latin typeface="+mn-lt"/>
+            </a:endParaRPr>
+          </a:p>
+          <a:p>
+            <a:pPr marL="285750" indent="-285750">
+              <a:buFont typeface="Arial" panose="020B0604020202020204" pitchFamily="34" charset="0"/>
+              <a:buChar char="•"/>
+            </a:pPr>
+            <a:r>
+              <a:rPr lang="en-US" sz="1600" b="0" dirty="0">
+                <a:latin typeface="+mn-lt"/>
+              </a:rPr>
+              <a:t>Customers with low income tend to have more open credit lines, which directly translates to high risk.</a:t>
             </a:r>
           </a:p>
         </p:txBody>
@@ -12432,6 +12681,588 @@
 </file>
 
 <file path=ppt/slides/slide16.xml><?xml version="1.0" encoding="utf-8"?>
+<p:sld xmlns:a="http://schemas.openxmlformats.org/drawingml/2006/main" xmlns:r="http://schemas.openxmlformats.org/officeDocument/2006/relationships" xmlns:p="http://schemas.openxmlformats.org/presentationml/2006/main">
+  <p:cSld>
+    <p:spTree>
+      <p:nvGrpSpPr>
+        <p:cNvPr id="1" name="">
+          <a:extLst>
+            <a:ext uri="{FF2B5EF4-FFF2-40B4-BE49-F238E27FC236}">
+              <a16:creationId xmlns:a16="http://schemas.microsoft.com/office/drawing/2014/main" id="{CEE1A0AF-9501-3916-F68D-69892F23638B}"/>
+            </a:ext>
+          </a:extLst>
+        </p:cNvPr>
+        <p:cNvGrpSpPr/>
+        <p:nvPr/>
+      </p:nvGrpSpPr>
+      <p:grpSpPr>
+        <a:xfrm>
+          <a:off x="0" y="0"/>
+          <a:ext cx="0" cy="0"/>
+          <a:chOff x="0" y="0"/>
+          <a:chExt cx="0" cy="0"/>
+        </a:xfrm>
+      </p:grpSpPr>
+      <p:sp>
+        <p:nvSpPr>
+          <p:cNvPr id="3" name="Title 2">
+            <a:extLst>
+              <a:ext uri="{FF2B5EF4-FFF2-40B4-BE49-F238E27FC236}">
+                <a16:creationId xmlns:a16="http://schemas.microsoft.com/office/drawing/2014/main" id="{4C04CFAC-8B81-5D2A-E6E8-6C5C6A3CE2E2}"/>
+              </a:ext>
+            </a:extLst>
+          </p:cNvPr>
+          <p:cNvSpPr>
+            <a:spLocks noGrp="1"/>
+          </p:cNvSpPr>
+          <p:nvPr>
+            <p:ph type="title"/>
+          </p:nvPr>
+        </p:nvSpPr>
+        <p:spPr>
+          <a:xfrm>
+            <a:off x="594360" y="102875"/>
+            <a:ext cx="10873740" cy="773425"/>
+          </a:xfrm>
+        </p:spPr>
+        <p:txBody>
+          <a:bodyPr/>
+          <a:lstStyle/>
+          <a:p>
+            <a:r>
+              <a:rPr lang="en-US" sz="3600" dirty="0"/>
+              <a:t>5. Recommendations</a:t>
+            </a:r>
+          </a:p>
+        </p:txBody>
+      </p:sp>
+      <p:graphicFrame>
+        <p:nvGraphicFramePr>
+          <p:cNvPr id="2" name="Table 1">
+            <a:extLst>
+              <a:ext uri="{FF2B5EF4-FFF2-40B4-BE49-F238E27FC236}">
+                <a16:creationId xmlns:a16="http://schemas.microsoft.com/office/drawing/2014/main" id="{3BA7B54B-87DA-DEEE-85DC-C9D5AF3B54EC}"/>
+              </a:ext>
+            </a:extLst>
+          </p:cNvPr>
+          <p:cNvGraphicFramePr>
+            <a:graphicFrameLocks noGrp="1"/>
+          </p:cNvGraphicFramePr>
+          <p:nvPr>
+            <p:extLst>
+              <p:ext uri="{D42A27DB-BD31-4B8C-83A1-F6EECF244321}">
+                <p14:modId xmlns:p14="http://schemas.microsoft.com/office/powerpoint/2010/main" val="3189516333"/>
+              </p:ext>
+            </p:extLst>
+          </p:nvPr>
+        </p:nvGraphicFramePr>
+        <p:xfrm>
+          <a:off x="1590676" y="1076325"/>
+          <a:ext cx="9991724" cy="5362576"/>
+        </p:xfrm>
+        <a:graphic>
+          <a:graphicData uri="http://schemas.openxmlformats.org/drawingml/2006/table">
+            <a:tbl>
+              <a:tblPr>
+                <a:tableStyleId>{8A107856-5554-42FB-B03E-39F5DBC370BA}</a:tableStyleId>
+              </a:tblPr>
+              <a:tblGrid>
+                <a:gridCol w="1408898">
+                  <a:extLst>
+                    <a:ext uri="{9D8B030D-6E8A-4147-A177-3AD203B41FA5}">
+                      <a16:colId xmlns:a16="http://schemas.microsoft.com/office/drawing/2014/main" val="1218196334"/>
+                    </a:ext>
+                  </a:extLst>
+                </a:gridCol>
+                <a:gridCol w="1580972">
+                  <a:extLst>
+                    <a:ext uri="{9D8B030D-6E8A-4147-A177-3AD203B41FA5}">
+                      <a16:colId xmlns:a16="http://schemas.microsoft.com/office/drawing/2014/main" val="3562513921"/>
+                    </a:ext>
+                  </a:extLst>
+                </a:gridCol>
+                <a:gridCol w="7001854">
+                  <a:extLst>
+                    <a:ext uri="{9D8B030D-6E8A-4147-A177-3AD203B41FA5}">
+                      <a16:colId xmlns:a16="http://schemas.microsoft.com/office/drawing/2014/main" val="4164433751"/>
+                    </a:ext>
+                  </a:extLst>
+                </a:gridCol>
+              </a:tblGrid>
+              <a:tr h="416321">
+                <a:tc>
+                  <a:txBody>
+                    <a:bodyPr/>
+                    <a:lstStyle/>
+                    <a:p>
+                      <a:pPr algn="ctr" fontAlgn="ctr"/>
+                      <a:r>
+                        <a:rPr lang="en-US" sz="1200" b="1" u="none" strike="noStrike" dirty="0">
+                          <a:effectLst/>
+                        </a:rPr>
+                        <a:t>Recommendation Category</a:t>
+                      </a:r>
+                      <a:endParaRPr lang="en-US" sz="1200" b="1" i="0" u="none" strike="noStrike" dirty="0">
+                        <a:solidFill>
+                          <a:srgbClr val="FFFFFF"/>
+                        </a:solidFill>
+                        <a:effectLst/>
+                        <a:latin typeface="Franklin Gothic Book" panose="020B0503020102020204" pitchFamily="34" charset="0"/>
+                      </a:endParaRPr>
+                    </a:p>
+                  </a:txBody>
+                  <a:tcPr marL="6799" marR="6799" marT="6799" marB="0" anchor="ctr"/>
+                </a:tc>
+                <a:tc>
+                  <a:txBody>
+                    <a:bodyPr/>
+                    <a:lstStyle/>
+                    <a:p>
+                      <a:pPr algn="ctr" fontAlgn="ctr"/>
+                      <a:r>
+                        <a:rPr lang="en-US" sz="1200" b="1" u="none" strike="noStrike" dirty="0">
+                          <a:effectLst/>
+                        </a:rPr>
+                        <a:t>Action</a:t>
+                      </a:r>
+                      <a:endParaRPr lang="en-US" sz="1200" b="1" i="0" u="none" strike="noStrike" dirty="0">
+                        <a:solidFill>
+                          <a:srgbClr val="FFFFFF"/>
+                        </a:solidFill>
+                        <a:effectLst/>
+                        <a:latin typeface="Franklin Gothic Book" panose="020B0503020102020204" pitchFamily="34" charset="0"/>
+                      </a:endParaRPr>
+                    </a:p>
+                  </a:txBody>
+                  <a:tcPr marL="6799" marR="6799" marT="6799" marB="0" anchor="ctr"/>
+                </a:tc>
+                <a:tc>
+                  <a:txBody>
+                    <a:bodyPr/>
+                    <a:lstStyle/>
+                    <a:p>
+                      <a:pPr algn="ctr" fontAlgn="ctr"/>
+                      <a:r>
+                        <a:rPr lang="en-US" sz="1200" b="1" u="none" strike="noStrike" dirty="0">
+                          <a:effectLst/>
+                        </a:rPr>
+                        <a:t>Positive Focus on Higher-Grade Customers</a:t>
+                      </a:r>
+                      <a:endParaRPr lang="en-US" sz="1200" b="1" i="0" u="none" strike="noStrike" dirty="0">
+                        <a:solidFill>
+                          <a:srgbClr val="FFFFFF"/>
+                        </a:solidFill>
+                        <a:effectLst/>
+                        <a:latin typeface="Franklin Gothic Book" panose="020B0503020102020204" pitchFamily="34" charset="0"/>
+                      </a:endParaRPr>
+                    </a:p>
+                  </a:txBody>
+                  <a:tcPr marL="6799" marR="6799" marT="6799" marB="0" anchor="ctr"/>
+                </a:tc>
+                <a:extLst>
+                  <a:ext uri="{0D108BD9-81ED-4DB2-BD59-A6C34878D82A}">
+                    <a16:rowId xmlns:a16="http://schemas.microsoft.com/office/drawing/2014/main" val="2674968027"/>
+                  </a:ext>
+                </a:extLst>
+              </a:tr>
+              <a:tr h="982520">
+                <a:tc>
+                  <a:txBody>
+                    <a:bodyPr/>
+                    <a:lstStyle/>
+                    <a:p>
+                      <a:pPr algn="l" fontAlgn="b"/>
+                      <a:r>
+                        <a:rPr lang="en-US" sz="1100" u="none" strike="noStrike" dirty="0">
+                          <a:effectLst/>
+                        </a:rPr>
+                        <a:t>Positive</a:t>
+                      </a:r>
+                      <a:endParaRPr lang="en-US" sz="1100" b="0" i="0" u="none" strike="noStrike" dirty="0">
+                        <a:solidFill>
+                          <a:srgbClr val="000000"/>
+                        </a:solidFill>
+                        <a:effectLst/>
+                        <a:latin typeface="Franklin Gothic Book" panose="020B0503020102020204" pitchFamily="34" charset="0"/>
+                      </a:endParaRPr>
+                    </a:p>
+                  </a:txBody>
+                  <a:tcPr marL="6799" marR="6799" marT="6799" marB="0" anchor="b"/>
+                </a:tc>
+                <a:tc>
+                  <a:txBody>
+                    <a:bodyPr/>
+                    <a:lstStyle/>
+                    <a:p>
+                      <a:pPr algn="l" fontAlgn="b"/>
+                      <a:r>
+                        <a:rPr lang="en-US" sz="1100" u="none" strike="noStrike" dirty="0">
+                          <a:effectLst/>
+                        </a:rPr>
+                        <a:t>Focus on Higher-Grade Customers</a:t>
+                      </a:r>
+                      <a:endParaRPr lang="en-US" sz="1100" b="0" i="0" u="none" strike="noStrike" dirty="0">
+                        <a:solidFill>
+                          <a:srgbClr val="000000"/>
+                        </a:solidFill>
+                        <a:effectLst/>
+                        <a:latin typeface="Franklin Gothic Book" panose="020B0503020102020204" pitchFamily="34" charset="0"/>
+                      </a:endParaRPr>
+                    </a:p>
+                  </a:txBody>
+                  <a:tcPr marL="6799" marR="6799" marT="6799" marB="0" anchor="b"/>
+                </a:tc>
+                <a:tc>
+                  <a:txBody>
+                    <a:bodyPr/>
+                    <a:lstStyle/>
+                    <a:p>
+                      <a:pPr algn="l" fontAlgn="b"/>
+                      <a:r>
+                        <a:rPr lang="en-US" sz="1100" u="none" strike="noStrike">
+                          <a:effectLst/>
+                        </a:rPr>
+                        <a:t>Prioritize loan offers to customers with credit grades A, B, and C. Explore targeted marketing campaigns to attract high-grade customers within the 6-9 years of employment segment. Consider offering competitive interest rates for high-grade customers to remain competitive while potentially increasing loan volume. Analyze the profitability of this segment while considering the lower interest rates.</a:t>
+                      </a:r>
+                      <a:endParaRPr lang="en-US" sz="1100" b="0" i="0" u="none" strike="noStrike">
+                        <a:solidFill>
+                          <a:srgbClr val="000000"/>
+                        </a:solidFill>
+                        <a:effectLst/>
+                        <a:latin typeface="Franklin Gothic Book" panose="020B0503020102020204" pitchFamily="34" charset="0"/>
+                      </a:endParaRPr>
+                    </a:p>
+                  </a:txBody>
+                  <a:tcPr marL="6799" marR="6799" marT="6799" marB="0" anchor="b"/>
+                </a:tc>
+                <a:extLst>
+                  <a:ext uri="{0D108BD9-81ED-4DB2-BD59-A6C34878D82A}">
+                    <a16:rowId xmlns:a16="http://schemas.microsoft.com/office/drawing/2014/main" val="637455855"/>
+                  </a:ext>
+                </a:extLst>
+              </a:tr>
+              <a:tr h="982520">
+                <a:tc>
+                  <a:txBody>
+                    <a:bodyPr/>
+                    <a:lstStyle/>
+                    <a:p>
+                      <a:pPr algn="l" fontAlgn="b"/>
+                      <a:r>
+                        <a:rPr lang="en-US" sz="1100" u="none" strike="noStrike" dirty="0">
+                          <a:effectLst/>
+                        </a:rPr>
+                        <a:t>Positive</a:t>
+                      </a:r>
+                      <a:endParaRPr lang="en-US" sz="1100" b="0" i="0" u="none" strike="noStrike" dirty="0">
+                        <a:solidFill>
+                          <a:srgbClr val="000000"/>
+                        </a:solidFill>
+                        <a:effectLst/>
+                        <a:latin typeface="Franklin Gothic Book" panose="020B0503020102020204" pitchFamily="34" charset="0"/>
+                      </a:endParaRPr>
+                    </a:p>
+                  </a:txBody>
+                  <a:tcPr marL="6799" marR="6799" marT="6799" marB="0" anchor="b"/>
+                </a:tc>
+                <a:tc>
+                  <a:txBody>
+                    <a:bodyPr/>
+                    <a:lstStyle/>
+                    <a:p>
+                      <a:pPr algn="l" fontAlgn="b"/>
+                      <a:r>
+                        <a:rPr lang="en-US" sz="1100" u="none" strike="noStrike" dirty="0">
+                          <a:effectLst/>
+                        </a:rPr>
+                        <a:t>Incentivize Good Behavior</a:t>
+                      </a:r>
+                      <a:endParaRPr lang="en-US" sz="1100" b="0" i="0" u="none" strike="noStrike" dirty="0">
+                        <a:solidFill>
+                          <a:srgbClr val="000000"/>
+                        </a:solidFill>
+                        <a:effectLst/>
+                        <a:latin typeface="Franklin Gothic Book" panose="020B0503020102020204" pitchFamily="34" charset="0"/>
+                      </a:endParaRPr>
+                    </a:p>
+                  </a:txBody>
+                  <a:tcPr marL="6799" marR="6799" marT="6799" marB="0" anchor="b"/>
+                </a:tc>
+                <a:tc>
+                  <a:txBody>
+                    <a:bodyPr/>
+                    <a:lstStyle/>
+                    <a:p>
+                      <a:pPr algn="l" fontAlgn="b"/>
+                      <a:r>
+                        <a:rPr lang="en-US" sz="1100" u="none" strike="noStrike" dirty="0">
+                          <a:effectLst/>
+                        </a:rPr>
+                        <a:t>Implement loyalty programs or reward systems for customers with consistently positive payment histories. Educate customers on the importance of maintaining good credit scores and minimizing derogatory records. Offer financial counseling services to assist customers in improving their creditworthiness. Monitor the impact of these incentives on loan approval rates and customer retention.</a:t>
+                      </a:r>
+                      <a:endParaRPr lang="en-US" sz="1100" b="0" i="0" u="none" strike="noStrike" dirty="0">
+                        <a:solidFill>
+                          <a:srgbClr val="000000"/>
+                        </a:solidFill>
+                        <a:effectLst/>
+                        <a:latin typeface="Franklin Gothic Book" panose="020B0503020102020204" pitchFamily="34" charset="0"/>
+                      </a:endParaRPr>
+                    </a:p>
+                  </a:txBody>
+                  <a:tcPr marL="6799" marR="6799" marT="6799" marB="0" anchor="b"/>
+                </a:tc>
+                <a:extLst>
+                  <a:ext uri="{0D108BD9-81ED-4DB2-BD59-A6C34878D82A}">
+                    <a16:rowId xmlns:a16="http://schemas.microsoft.com/office/drawing/2014/main" val="2056925380"/>
+                  </a:ext>
+                </a:extLst>
+              </a:tr>
+              <a:tr h="1016175">
+                <a:tc>
+                  <a:txBody>
+                    <a:bodyPr/>
+                    <a:lstStyle/>
+                    <a:p>
+                      <a:pPr algn="l" fontAlgn="b"/>
+                      <a:r>
+                        <a:rPr lang="en-US" sz="1100" u="none" strike="noStrike">
+                          <a:effectLst/>
+                        </a:rPr>
+                        <a:t>Positive</a:t>
+                      </a:r>
+                      <a:endParaRPr lang="en-US" sz="1100" b="0" i="0" u="none" strike="noStrike">
+                        <a:solidFill>
+                          <a:srgbClr val="000000"/>
+                        </a:solidFill>
+                        <a:effectLst/>
+                        <a:latin typeface="Franklin Gothic Book" panose="020B0503020102020204" pitchFamily="34" charset="0"/>
+                      </a:endParaRPr>
+                    </a:p>
+                  </a:txBody>
+                  <a:tcPr marL="6799" marR="6799" marT="6799" marB="0" anchor="b"/>
+                </a:tc>
+                <a:tc>
+                  <a:txBody>
+                    <a:bodyPr/>
+                    <a:lstStyle/>
+                    <a:p>
+                      <a:pPr algn="l" fontAlgn="b"/>
+                      <a:r>
+                        <a:rPr lang="en-US" sz="1100" u="none" strike="noStrike" dirty="0">
+                          <a:effectLst/>
+                        </a:rPr>
+                        <a:t>Promote Longer Loan Terms</a:t>
+                      </a:r>
+                      <a:endParaRPr lang="en-US" sz="1100" b="0" i="0" u="none" strike="noStrike" dirty="0">
+                        <a:solidFill>
+                          <a:srgbClr val="000000"/>
+                        </a:solidFill>
+                        <a:effectLst/>
+                        <a:latin typeface="Franklin Gothic Book" panose="020B0503020102020204" pitchFamily="34" charset="0"/>
+                      </a:endParaRPr>
+                    </a:p>
+                  </a:txBody>
+                  <a:tcPr marL="6799" marR="6799" marT="6799" marB="0" anchor="b"/>
+                </a:tc>
+                <a:tc>
+                  <a:txBody>
+                    <a:bodyPr/>
+                    <a:lstStyle/>
+                    <a:p>
+                      <a:pPr algn="l" fontAlgn="b"/>
+                      <a:r>
+                        <a:rPr lang="en-US" sz="1100" u="none" strike="noStrike" dirty="0">
+                          <a:effectLst/>
+                        </a:rPr>
+                        <a:t>Educate customers on the benefits of longer loan terms, such as lower monthly installments and potential long-term cost savings. Offer flexible loan term options to cater to individual customer needs and financial situations. Clearly communicate the impact of loan term on total interest payments to ensure transparency. Monitor customer satisfaction and repayment rates across different loan terms.</a:t>
+                      </a:r>
+                      <a:endParaRPr lang="en-US" sz="1100" b="0" i="0" u="none" strike="noStrike" dirty="0">
+                        <a:solidFill>
+                          <a:srgbClr val="000000"/>
+                        </a:solidFill>
+                        <a:effectLst/>
+                        <a:latin typeface="Franklin Gothic Book" panose="020B0503020102020204" pitchFamily="34" charset="0"/>
+                      </a:endParaRPr>
+                    </a:p>
+                  </a:txBody>
+                  <a:tcPr marL="6799" marR="6799" marT="6799" marB="0" anchor="b"/>
+                </a:tc>
+                <a:extLst>
+                  <a:ext uri="{0D108BD9-81ED-4DB2-BD59-A6C34878D82A}">
+                    <a16:rowId xmlns:a16="http://schemas.microsoft.com/office/drawing/2014/main" val="1020292813"/>
+                  </a:ext>
+                </a:extLst>
+              </a:tr>
+              <a:tr h="982520">
+                <a:tc>
+                  <a:txBody>
+                    <a:bodyPr/>
+                    <a:lstStyle/>
+                    <a:p>
+                      <a:pPr algn="l" fontAlgn="b"/>
+                      <a:r>
+                        <a:rPr lang="en-US" sz="1100" u="none" strike="noStrike">
+                          <a:effectLst/>
+                        </a:rPr>
+                        <a:t>Positive</a:t>
+                      </a:r>
+                      <a:endParaRPr lang="en-US" sz="1100" b="0" i="0" u="none" strike="noStrike">
+                        <a:solidFill>
+                          <a:srgbClr val="000000"/>
+                        </a:solidFill>
+                        <a:effectLst/>
+                        <a:latin typeface="Franklin Gothic Book" panose="020B0503020102020204" pitchFamily="34" charset="0"/>
+                      </a:endParaRPr>
+                    </a:p>
+                  </a:txBody>
+                  <a:tcPr marL="6799" marR="6799" marT="6799" marB="0" anchor="b"/>
+                </a:tc>
+                <a:tc>
+                  <a:txBody>
+                    <a:bodyPr/>
+                    <a:lstStyle/>
+                    <a:p>
+                      <a:pPr algn="l" fontAlgn="b"/>
+                      <a:r>
+                        <a:rPr lang="en-US" sz="1100" u="none" strike="noStrike" dirty="0">
+                          <a:effectLst/>
+                        </a:rPr>
+                        <a:t>Incorporate Debt-to-Income Ratio</a:t>
+                      </a:r>
+                      <a:endParaRPr lang="en-US" sz="1100" b="0" i="0" u="none" strike="noStrike" dirty="0">
+                        <a:solidFill>
+                          <a:srgbClr val="000000"/>
+                        </a:solidFill>
+                        <a:effectLst/>
+                        <a:latin typeface="Franklin Gothic Book" panose="020B0503020102020204" pitchFamily="34" charset="0"/>
+                      </a:endParaRPr>
+                    </a:p>
+                  </a:txBody>
+                  <a:tcPr marL="6799" marR="6799" marT="6799" marB="0" anchor="b"/>
+                </a:tc>
+                <a:tc>
+                  <a:txBody>
+                    <a:bodyPr/>
+                    <a:lstStyle/>
+                    <a:p>
+                      <a:pPr algn="l" fontAlgn="b"/>
+                      <a:r>
+                        <a:rPr lang="en-US" sz="1100" u="none" strike="noStrike" dirty="0">
+                          <a:effectLst/>
+                        </a:rPr>
+                        <a:t>Implement a robust debt-to-income (DTI) ratio assessment as a key factor in loan approval decisions. Establish clear DTI thresholds for different loan products and risk categories. Develop a scoring system that incorporates DTI along with other relevant credit risk factors. Regularly review and adjust DTI thresholds based on market trends and internal risk assessments.</a:t>
+                      </a:r>
+                      <a:endParaRPr lang="en-US" sz="1100" b="0" i="0" u="none" strike="noStrike" dirty="0">
+                        <a:solidFill>
+                          <a:srgbClr val="000000"/>
+                        </a:solidFill>
+                        <a:effectLst/>
+                        <a:latin typeface="Franklin Gothic Book" panose="020B0503020102020204" pitchFamily="34" charset="0"/>
+                      </a:endParaRPr>
+                    </a:p>
+                  </a:txBody>
+                  <a:tcPr marL="6799" marR="6799" marT="6799" marB="0" anchor="b"/>
+                </a:tc>
+                <a:extLst>
+                  <a:ext uri="{0D108BD9-81ED-4DB2-BD59-A6C34878D82A}">
+                    <a16:rowId xmlns:a16="http://schemas.microsoft.com/office/drawing/2014/main" val="3814409612"/>
+                  </a:ext>
+                </a:extLst>
+              </a:tr>
+              <a:tr h="982520">
+                <a:tc>
+                  <a:txBody>
+                    <a:bodyPr/>
+                    <a:lstStyle/>
+                    <a:p>
+                      <a:pPr algn="l" fontAlgn="b"/>
+                      <a:r>
+                        <a:rPr lang="en-US" sz="1100" u="none" strike="noStrike">
+                          <a:effectLst/>
+                        </a:rPr>
+                        <a:t>Negative</a:t>
+                      </a:r>
+                      <a:endParaRPr lang="en-US" sz="1100" b="0" i="0" u="none" strike="noStrike">
+                        <a:solidFill>
+                          <a:srgbClr val="000000"/>
+                        </a:solidFill>
+                        <a:effectLst/>
+                        <a:latin typeface="Franklin Gothic Book" panose="020B0503020102020204" pitchFamily="34" charset="0"/>
+                      </a:endParaRPr>
+                    </a:p>
+                  </a:txBody>
+                  <a:tcPr marL="6799" marR="6799" marT="6799" marB="0" anchor="b"/>
+                </a:tc>
+                <a:tc>
+                  <a:txBody>
+                    <a:bodyPr/>
+                    <a:lstStyle/>
+                    <a:p>
+                      <a:pPr algn="l" fontAlgn="b"/>
+                      <a:r>
+                        <a:rPr lang="en-US" sz="1100" u="none" strike="noStrike" dirty="0">
+                          <a:effectLst/>
+                        </a:rPr>
+                        <a:t>Avoid Over-reliance on Low-Risk Segments</a:t>
+                      </a:r>
+                      <a:endParaRPr lang="en-US" sz="1100" b="0" i="0" u="none" strike="noStrike" dirty="0">
+                        <a:solidFill>
+                          <a:srgbClr val="000000"/>
+                        </a:solidFill>
+                        <a:effectLst/>
+                        <a:latin typeface="Franklin Gothic Book" panose="020B0503020102020204" pitchFamily="34" charset="0"/>
+                      </a:endParaRPr>
+                    </a:p>
+                  </a:txBody>
+                  <a:tcPr marL="6799" marR="6799" marT="6799" marB="0" anchor="b"/>
+                </a:tc>
+                <a:tc>
+                  <a:txBody>
+                    <a:bodyPr/>
+                    <a:lstStyle/>
+                    <a:p>
+                      <a:pPr algn="l" fontAlgn="b"/>
+                      <a:r>
+                        <a:rPr lang="en-US" sz="1100" u="none" strike="noStrike" dirty="0">
+                          <a:effectLst/>
+                        </a:rPr>
+                        <a:t>Avoid over-concentrating loan portfolios in the low-risk (high-grade) segment, as this may limit overall profitability. Diversify lending strategies to include moderate-risk segments while maintaining appropriate risk controls. Continuously monitor the risk-return profile of the loan portfolio and adjust lending strategies accordingly.</a:t>
+                      </a:r>
+                      <a:endParaRPr lang="en-US" sz="1100" b="0" i="0" u="none" strike="noStrike" dirty="0">
+                        <a:solidFill>
+                          <a:srgbClr val="000000"/>
+                        </a:solidFill>
+                        <a:effectLst/>
+                        <a:latin typeface="Franklin Gothic Book" panose="020B0503020102020204" pitchFamily="34" charset="0"/>
+                      </a:endParaRPr>
+                    </a:p>
+                  </a:txBody>
+                  <a:tcPr marL="6799" marR="6799" marT="6799" marB="0" anchor="b"/>
+                </a:tc>
+                <a:extLst>
+                  <a:ext uri="{0D108BD9-81ED-4DB2-BD59-A6C34878D82A}">
+                    <a16:rowId xmlns:a16="http://schemas.microsoft.com/office/drawing/2014/main" val="1240302798"/>
+                  </a:ext>
+                </a:extLst>
+              </a:tr>
+            </a:tbl>
+          </a:graphicData>
+        </a:graphic>
+      </p:graphicFrame>
+    </p:spTree>
+    <p:extLst>
+      <p:ext uri="{BB962C8B-B14F-4D97-AF65-F5344CB8AC3E}">
+        <p14:creationId xmlns:p14="http://schemas.microsoft.com/office/powerpoint/2010/main" val="2419074275"/>
+      </p:ext>
+    </p:extLst>
+  </p:cSld>
+  <p:clrMapOvr>
+    <a:masterClrMapping/>
+  </p:clrMapOvr>
+</p:sld>
+</file>
+
+<file path=ppt/slides/slide17.xml><?xml version="1.0" encoding="utf-8"?>
 <p:sld xmlns:a="http://schemas.openxmlformats.org/drawingml/2006/main" xmlns:r="http://schemas.openxmlformats.org/officeDocument/2006/relationships" xmlns:p="http://schemas.openxmlformats.org/presentationml/2006/main">
   <p:cSld>
     <p:spTree>
@@ -12678,7 +13509,7 @@
             </a:pPr>
             <a:r>
               <a:rPr lang="en-US" dirty="0"/>
-              <a:t>Summary and Results</a:t>
+              <a:t>Key Takeaway</a:t>
             </a:r>
           </a:p>
         </p:txBody>
@@ -17439,15 +18270,6 @@
 </file>
 
 <file path=customXml/item1.xml><?xml version="1.0" encoding="utf-8"?>
-<?mso-contentType ?>
-<FormTemplates xmlns="http://schemas.microsoft.com/sharepoint/v3/contenttype/forms">
-  <Display>DocumentLibraryForm</Display>
-  <Edit>DocumentLibraryForm</Edit>
-  <New>DocumentLibraryForm</New>
-</FormTemplates>
-</file>
-
-<file path=customXml/item2.xml><?xml version="1.0" encoding="utf-8"?>
 <p:properties xmlns:p="http://schemas.microsoft.com/office/2006/metadata/properties" xmlns:xsi="http://www.w3.org/2001/XMLSchema-instance" xmlns:pc="http://schemas.microsoft.com/office/infopath/2007/PartnerControls">
   <documentManagement>
     <Background xmlns="71af3243-3dd4-4a8d-8c0d-dd76da1f02a5">false</Background>
@@ -17465,6 +18287,15 @@
     <MediaServiceKeyPoints xmlns="71af3243-3dd4-4a8d-8c0d-dd76da1f02a5" xsi:nil="true"/>
   </documentManagement>
 </p:properties>
+</file>
+
+<file path=customXml/item2.xml><?xml version="1.0" encoding="utf-8"?>
+<?mso-contentType ?>
+<FormTemplates xmlns="http://schemas.microsoft.com/sharepoint/v3/contenttype/forms">
+  <Display>DocumentLibraryForm</Display>
+  <Edit>DocumentLibraryForm</Edit>
+  <New>DocumentLibraryForm</New>
+</FormTemplates>
 </file>
 
 <file path=customXml/item3.xml><?xml version="1.0" encoding="utf-8"?>
@@ -17780,14 +18611,6 @@
 </file>
 
 <file path=customXml/itemProps1.xml><?xml version="1.0" encoding="utf-8"?>
-<ds:datastoreItem xmlns:ds="http://schemas.openxmlformats.org/officeDocument/2006/customXml" ds:itemID="{C21FFAC0-05A2-416A-B06C-C248395482CF}">
-  <ds:schemaRefs>
-    <ds:schemaRef ds:uri="http://schemas.microsoft.com/sharepoint/v3/contenttype/forms"/>
-  </ds:schemaRefs>
-</ds:datastoreItem>
-</file>
-
-<file path=customXml/itemProps2.xml><?xml version="1.0" encoding="utf-8"?>
 <ds:datastoreItem xmlns:ds="http://schemas.openxmlformats.org/officeDocument/2006/customXml" ds:itemID="{4F4B194E-8B30-4377-8C59-ECFB902D2A26}">
   <ds:schemaRefs>
     <ds:schemaRef ds:uri="http://schemas.microsoft.com/office/2006/metadata/properties"/>
@@ -17795,6 +18618,14 @@
     <ds:schemaRef ds:uri="71af3243-3dd4-4a8d-8c0d-dd76da1f02a5"/>
     <ds:schemaRef ds:uri="http://schemas.microsoft.com/sharepoint/v3"/>
     <ds:schemaRef ds:uri="230e9df3-be65-4c73-a93b-d1236ebd677e"/>
+  </ds:schemaRefs>
+</ds:datastoreItem>
+</file>
+
+<file path=customXml/itemProps2.xml><?xml version="1.0" encoding="utf-8"?>
+<ds:datastoreItem xmlns:ds="http://schemas.openxmlformats.org/officeDocument/2006/customXml" ds:itemID="{C21FFAC0-05A2-416A-B06C-C248395482CF}">
+  <ds:schemaRefs>
+    <ds:schemaRef ds:uri="http://schemas.microsoft.com/sharepoint/v3/contenttype/forms"/>
   </ds:schemaRefs>
 </ds:datastoreItem>
 </file>

</xml_diff>

<commit_message>
Updated the file name Updated pptx changes from Vaishali Printed presentation to pdf.
</commit_message>
<xml_diff>
--- a/UvarajThulasiram.pptx
+++ b/UvarajThulasiram.pptx
@@ -10749,6 +10749,270 @@
           </a:p>
         </p:txBody>
       </p:sp>
+      <p:sp>
+        <p:nvSpPr>
+          <p:cNvPr id="3" name="Text Placeholder 2">
+            <a:extLst>
+              <a:ext uri="{FF2B5EF4-FFF2-40B4-BE49-F238E27FC236}">
+                <a16:creationId xmlns:a16="http://schemas.microsoft.com/office/drawing/2014/main" id="{0FD75664-B820-E862-287E-37AF0A8ADC8D}"/>
+              </a:ext>
+            </a:extLst>
+          </p:cNvPr>
+          <p:cNvSpPr txBox="1">
+            <a:spLocks/>
+          </p:cNvSpPr>
+          <p:nvPr/>
+        </p:nvSpPr>
+        <p:spPr>
+          <a:xfrm>
+            <a:off x="6309904" y="4357047"/>
+            <a:ext cx="5486400" cy="1645920"/>
+          </a:xfrm>
+          <a:prstGeom prst="rect">
+            <a:avLst/>
+          </a:prstGeom>
+        </p:spPr>
+        <p:txBody>
+          <a:bodyPr/>
+          <a:lstStyle>
+            <a:lvl1pPr marL="228600" indent="-283464" algn="l" defTabSz="914400" rtl="0" eaLnBrk="1" latinLnBrk="0" hangingPunct="1">
+              <a:lnSpc>
+                <a:spcPct val="90000"/>
+              </a:lnSpc>
+              <a:spcBef>
+                <a:spcPts val="1000"/>
+              </a:spcBef>
+              <a:buFont typeface="Arial" panose="020B0604020202020204" pitchFamily="34" charset="0"/>
+              <a:buChar char="•"/>
+              <a:defRPr sz="2800" b="0" i="0" kern="1200">
+                <a:solidFill>
+                  <a:schemeClr val="bg1"/>
+                </a:solidFill>
+                <a:latin typeface="+mn-lt"/>
+                <a:ea typeface="+mn-ea"/>
+                <a:cs typeface="+mn-cs"/>
+              </a:defRPr>
+            </a:lvl1pPr>
+            <a:lvl2pPr marL="685800" indent="-283464" algn="l" defTabSz="914400" rtl="0" eaLnBrk="1" latinLnBrk="0" hangingPunct="1">
+              <a:lnSpc>
+                <a:spcPct val="90000"/>
+              </a:lnSpc>
+              <a:spcBef>
+                <a:spcPts val="500"/>
+              </a:spcBef>
+              <a:buFont typeface="Arial" panose="020B0604020202020204" pitchFamily="34" charset="0"/>
+              <a:buChar char="•"/>
+              <a:defRPr sz="2400" b="0" i="0" kern="1200">
+                <a:solidFill>
+                  <a:schemeClr val="bg1"/>
+                </a:solidFill>
+                <a:latin typeface="+mn-lt"/>
+                <a:ea typeface="+mn-ea"/>
+                <a:cs typeface="+mn-cs"/>
+              </a:defRPr>
+            </a:lvl2pPr>
+            <a:lvl3pPr marL="1143000" indent="-283464" algn="l" defTabSz="914400" rtl="0" eaLnBrk="1" latinLnBrk="0" hangingPunct="1">
+              <a:lnSpc>
+                <a:spcPct val="90000"/>
+              </a:lnSpc>
+              <a:spcBef>
+                <a:spcPts val="500"/>
+              </a:spcBef>
+              <a:buFont typeface="Arial" panose="020B0604020202020204" pitchFamily="34" charset="0"/>
+              <a:buChar char="•"/>
+              <a:defRPr sz="2000" b="0" i="0" kern="1200">
+                <a:solidFill>
+                  <a:schemeClr val="bg1"/>
+                </a:solidFill>
+                <a:latin typeface="+mn-lt"/>
+                <a:ea typeface="+mn-ea"/>
+                <a:cs typeface="+mn-cs"/>
+              </a:defRPr>
+            </a:lvl3pPr>
+            <a:lvl4pPr marL="1600200" indent="-283464" algn="l" defTabSz="914400" rtl="0" eaLnBrk="1" latinLnBrk="0" hangingPunct="1">
+              <a:lnSpc>
+                <a:spcPct val="90000"/>
+              </a:lnSpc>
+              <a:spcBef>
+                <a:spcPts val="500"/>
+              </a:spcBef>
+              <a:buFont typeface="Arial" panose="020B0604020202020204" pitchFamily="34" charset="0"/>
+              <a:buChar char="•"/>
+              <a:defRPr sz="1800" b="0" i="0" kern="1200">
+                <a:solidFill>
+                  <a:schemeClr val="bg1"/>
+                </a:solidFill>
+                <a:latin typeface="+mn-lt"/>
+                <a:ea typeface="+mn-ea"/>
+                <a:cs typeface="+mn-cs"/>
+              </a:defRPr>
+            </a:lvl4pPr>
+            <a:lvl5pPr marL="2057400" indent="-283464" algn="l" defTabSz="914400" rtl="0" eaLnBrk="1" latinLnBrk="0" hangingPunct="1">
+              <a:lnSpc>
+                <a:spcPct val="90000"/>
+              </a:lnSpc>
+              <a:spcBef>
+                <a:spcPts val="500"/>
+              </a:spcBef>
+              <a:buFont typeface="Arial" panose="020B0604020202020204" pitchFamily="34" charset="0"/>
+              <a:buChar char="•"/>
+              <a:defRPr sz="1800" b="0" i="0" kern="1200">
+                <a:solidFill>
+                  <a:schemeClr val="bg1"/>
+                </a:solidFill>
+                <a:latin typeface="+mn-lt"/>
+                <a:ea typeface="+mn-ea"/>
+                <a:cs typeface="+mn-cs"/>
+              </a:defRPr>
+            </a:lvl5pPr>
+            <a:lvl6pPr marL="2514600" indent="-228600" algn="l" defTabSz="914400" rtl="0" eaLnBrk="1" latinLnBrk="0" hangingPunct="1">
+              <a:lnSpc>
+                <a:spcPct val="90000"/>
+              </a:lnSpc>
+              <a:spcBef>
+                <a:spcPts val="500"/>
+              </a:spcBef>
+              <a:buFont typeface="Arial" panose="020B0604020202020204" pitchFamily="34" charset="0"/>
+              <a:buChar char="•"/>
+              <a:defRPr sz="1800" kern="1200">
+                <a:solidFill>
+                  <a:schemeClr val="tx1"/>
+                </a:solidFill>
+                <a:latin typeface="+mn-lt"/>
+                <a:ea typeface="+mn-ea"/>
+                <a:cs typeface="+mn-cs"/>
+              </a:defRPr>
+            </a:lvl6pPr>
+            <a:lvl7pPr marL="2971800" indent="-228600" algn="l" defTabSz="914400" rtl="0" eaLnBrk="1" latinLnBrk="0" hangingPunct="1">
+              <a:lnSpc>
+                <a:spcPct val="90000"/>
+              </a:lnSpc>
+              <a:spcBef>
+                <a:spcPts val="500"/>
+              </a:spcBef>
+              <a:buFont typeface="Arial" panose="020B0604020202020204" pitchFamily="34" charset="0"/>
+              <a:buChar char="•"/>
+              <a:defRPr sz="1800" kern="1200">
+                <a:solidFill>
+                  <a:schemeClr val="tx1"/>
+                </a:solidFill>
+                <a:latin typeface="+mn-lt"/>
+                <a:ea typeface="+mn-ea"/>
+                <a:cs typeface="+mn-cs"/>
+              </a:defRPr>
+            </a:lvl7pPr>
+            <a:lvl8pPr marL="3429000" indent="-228600" algn="l" defTabSz="914400" rtl="0" eaLnBrk="1" latinLnBrk="0" hangingPunct="1">
+              <a:lnSpc>
+                <a:spcPct val="90000"/>
+              </a:lnSpc>
+              <a:spcBef>
+                <a:spcPts val="500"/>
+              </a:spcBef>
+              <a:buFont typeface="Arial" panose="020B0604020202020204" pitchFamily="34" charset="0"/>
+              <a:buChar char="•"/>
+              <a:defRPr sz="1800" kern="1200">
+                <a:solidFill>
+                  <a:schemeClr val="tx1"/>
+                </a:solidFill>
+                <a:latin typeface="+mn-lt"/>
+                <a:ea typeface="+mn-ea"/>
+                <a:cs typeface="+mn-cs"/>
+              </a:defRPr>
+            </a:lvl8pPr>
+            <a:lvl9pPr marL="3886200" indent="-228600" algn="l" defTabSz="914400" rtl="0" eaLnBrk="1" latinLnBrk="0" hangingPunct="1">
+              <a:lnSpc>
+                <a:spcPct val="90000"/>
+              </a:lnSpc>
+              <a:spcBef>
+                <a:spcPts val="500"/>
+              </a:spcBef>
+              <a:buFont typeface="Arial" panose="020B0604020202020204" pitchFamily="34" charset="0"/>
+              <a:buChar char="•"/>
+              <a:defRPr sz="1800" kern="1200">
+                <a:solidFill>
+                  <a:schemeClr val="tx1"/>
+                </a:solidFill>
+                <a:latin typeface="+mn-lt"/>
+                <a:ea typeface="+mn-ea"/>
+                <a:cs typeface="+mn-cs"/>
+              </a:defRPr>
+            </a:lvl9pPr>
+          </a:lstStyle>
+          <a:p>
+            <a:pPr marL="0" indent="0" algn="r">
+              <a:buNone/>
+            </a:pPr>
+            <a:r>
+              <a:rPr lang="en-US" sz="2400" dirty="0">
+                <a:solidFill>
+                  <a:schemeClr val="tx2">
+                    <a:lumMod val="50000"/>
+                  </a:schemeClr>
+                </a:solidFill>
+                <a:latin typeface="+mj-lt"/>
+              </a:rPr>
+              <a:t>Facilitator: </a:t>
+            </a:r>
+            <a:r>
+              <a:rPr lang="en-US" sz="2400" dirty="0" err="1">
+                <a:solidFill>
+                  <a:schemeClr val="tx2">
+                    <a:lumMod val="50000"/>
+                  </a:schemeClr>
+                </a:solidFill>
+                <a:latin typeface="+mj-lt"/>
+              </a:rPr>
+              <a:t>Uvaraj</a:t>
+            </a:r>
+            <a:r>
+              <a:rPr lang="en-US" sz="2400" dirty="0">
+                <a:solidFill>
+                  <a:schemeClr val="tx2">
+                    <a:lumMod val="50000"/>
+                  </a:schemeClr>
+                </a:solidFill>
+                <a:latin typeface="+mj-lt"/>
+              </a:rPr>
+              <a:t> </a:t>
+            </a:r>
+            <a:r>
+              <a:rPr lang="en-US" sz="2400" dirty="0" err="1">
+                <a:solidFill>
+                  <a:schemeClr val="tx2">
+                    <a:lumMod val="50000"/>
+                  </a:schemeClr>
+                </a:solidFill>
+                <a:latin typeface="+mj-lt"/>
+              </a:rPr>
+              <a:t>Thulasiram</a:t>
+            </a:r>
+            <a:endParaRPr lang="en-US" sz="2400" dirty="0">
+              <a:solidFill>
+                <a:schemeClr val="tx2">
+                  <a:lumMod val="50000"/>
+                </a:schemeClr>
+              </a:solidFill>
+              <a:latin typeface="+mj-lt"/>
+            </a:endParaRPr>
+          </a:p>
+          <a:p>
+            <a:pPr marL="0" indent="0" algn="r">
+              <a:buNone/>
+            </a:pPr>
+            <a:r>
+              <a:rPr lang="en-US" sz="2400" dirty="0">
+                <a:solidFill>
+                  <a:schemeClr val="tx2">
+                    <a:lumMod val="50000"/>
+                  </a:schemeClr>
+                </a:solidFill>
+                <a:latin typeface="+mj-lt"/>
+              </a:rPr>
+              <a:t>Team member: Vaishali Makwana</a:t>
+            </a:r>
+          </a:p>
+        </p:txBody>
+      </p:sp>
     </p:spTree>
     <p:extLst>
       <p:ext uri="{BB962C8B-B14F-4D97-AF65-F5344CB8AC3E}">
@@ -12751,37 +13015,40 @@
           <p:nvPr>
             <p:extLst>
               <p:ext uri="{D42A27DB-BD31-4B8C-83A1-F6EECF244321}">
-                <p14:modId xmlns:p14="http://schemas.microsoft.com/office/powerpoint/2010/main" val="3189516333"/>
+                <p14:modId xmlns:p14="http://schemas.microsoft.com/office/powerpoint/2010/main" val="4035599919"/>
               </p:ext>
             </p:extLst>
           </p:nvPr>
         </p:nvGraphicFramePr>
         <p:xfrm>
-          <a:off x="1590676" y="1076325"/>
-          <a:ext cx="9991724" cy="5362576"/>
+          <a:off x="1504060" y="1010122"/>
+          <a:ext cx="10078341" cy="5523599"/>
         </p:xfrm>
         <a:graphic>
           <a:graphicData uri="http://schemas.openxmlformats.org/drawingml/2006/table">
             <a:tbl>
               <a:tblPr>
-                <a:tableStyleId>{8A107856-5554-42FB-B03E-39F5DBC370BA}</a:tableStyleId>
+                <a:solidFill>
+                  <a:srgbClr val="B5E0FD"/>
+                </a:solidFill>
+                <a:tableStyleId>{69CF1AB2-1976-4502-BF36-3FF5EA218861}</a:tableStyleId>
               </a:tblPr>
               <a:tblGrid>
-                <a:gridCol w="1408898">
+                <a:gridCol w="1421112">
                   <a:extLst>
                     <a:ext uri="{9D8B030D-6E8A-4147-A177-3AD203B41FA5}">
                       <a16:colId xmlns:a16="http://schemas.microsoft.com/office/drawing/2014/main" val="1218196334"/>
                     </a:ext>
                   </a:extLst>
                 </a:gridCol>
-                <a:gridCol w="1580972">
+                <a:gridCol w="1594677">
                   <a:extLst>
                     <a:ext uri="{9D8B030D-6E8A-4147-A177-3AD203B41FA5}">
                       <a16:colId xmlns:a16="http://schemas.microsoft.com/office/drawing/2014/main" val="3562513921"/>
                     </a:ext>
                   </a:extLst>
                 </a:gridCol>
-                <a:gridCol w="7001854">
+                <a:gridCol w="7062552">
                   <a:extLst>
                     <a:ext uri="{9D8B030D-6E8A-4147-A177-3AD203B41FA5}">
                       <a16:colId xmlns:a16="http://schemas.microsoft.com/office/drawing/2014/main" val="4164433751"/>
@@ -12789,7 +13056,7 @@
                   </a:extLst>
                 </a:gridCol>
               </a:tblGrid>
-              <a:tr h="416321">
+              <a:tr h="571035">
                 <a:tc>
                   <a:txBody>
                     <a:bodyPr/>
@@ -12811,7 +13078,11 @@
                       </a:endParaRPr>
                     </a:p>
                   </a:txBody>
-                  <a:tcPr marL="6799" marR="6799" marT="6799" marB="0" anchor="ctr"/>
+                  <a:tcPr marL="109728" marR="109728" marT="109728" marB="109728" anchor="ctr">
+                    <a:solidFill>
+                      <a:srgbClr val="B5E0FD"/>
+                    </a:solidFill>
+                  </a:tcPr>
                 </a:tc>
                 <a:tc>
                   <a:txBody>
@@ -12834,7 +13105,11 @@
                       </a:endParaRPr>
                     </a:p>
                   </a:txBody>
-                  <a:tcPr marL="6799" marR="6799" marT="6799" marB="0" anchor="ctr"/>
+                  <a:tcPr marL="109728" marR="109728" marT="109728" marB="109728" anchor="ctr">
+                    <a:solidFill>
+                      <a:srgbClr val="B5E0FD"/>
+                    </a:solidFill>
+                  </a:tcPr>
                 </a:tc>
                 <a:tc>
                   <a:txBody>
@@ -12857,7 +13132,11 @@
                       </a:endParaRPr>
                     </a:p>
                   </a:txBody>
-                  <a:tcPr marL="6799" marR="6799" marT="6799" marB="0" anchor="ctr"/>
+                  <a:tcPr marL="109728" marR="109728" marT="109728" marB="109728" anchor="ctr">
+                    <a:solidFill>
+                      <a:srgbClr val="B5E0FD"/>
+                    </a:solidFill>
+                  </a:tcPr>
                 </a:tc>
                 <a:extLst>
                   <a:ext uri="{0D108BD9-81ED-4DB2-BD59-A6C34878D82A}">
@@ -12865,13 +13144,13 @@
                   </a:ext>
                 </a:extLst>
               </a:tr>
-              <a:tr h="982520">
+              <a:tr h="1195604">
                 <a:tc>
                   <a:txBody>
                     <a:bodyPr/>
                     <a:lstStyle/>
                     <a:p>
-                      <a:pPr algn="l" fontAlgn="b"/>
+                      <a:pPr algn="ctr" fontAlgn="b"/>
                       <a:r>
                         <a:rPr lang="en-US" sz="1100" u="none" strike="noStrike" dirty="0">
                           <a:effectLst/>
@@ -12887,14 +13166,18 @@
                       </a:endParaRPr>
                     </a:p>
                   </a:txBody>
-                  <a:tcPr marL="6799" marR="6799" marT="6799" marB="0" anchor="b"/>
+                  <a:tcPr marL="109728" marR="109728" marT="109728" marB="109728" anchor="ctr">
+                    <a:solidFill>
+                      <a:srgbClr val="E6F4FE"/>
+                    </a:solidFill>
+                  </a:tcPr>
                 </a:tc>
                 <a:tc>
                   <a:txBody>
                     <a:bodyPr/>
                     <a:lstStyle/>
                     <a:p>
-                      <a:pPr algn="l" fontAlgn="b"/>
+                      <a:pPr algn="ctr" fontAlgn="b"/>
                       <a:r>
                         <a:rPr lang="en-US" sz="1100" u="none" strike="noStrike" dirty="0">
                           <a:effectLst/>
@@ -12910,21 +13193,64 @@
                       </a:endParaRPr>
                     </a:p>
                   </a:txBody>
-                  <a:tcPr marL="6799" marR="6799" marT="6799" marB="0" anchor="b"/>
+                  <a:tcPr marL="109728" marR="109728" marT="109728" marB="109728" anchor="ctr">
+                    <a:solidFill>
+                      <a:srgbClr val="E6F4FE"/>
+                    </a:solidFill>
+                  </a:tcPr>
                 </a:tc>
                 <a:tc>
                   <a:txBody>
                     <a:bodyPr/>
                     <a:lstStyle/>
                     <a:p>
-                      <a:pPr algn="l" fontAlgn="b"/>
+                      <a:pPr marL="171450" indent="-171450" algn="l" fontAlgn="b">
+                        <a:buFont typeface="Arial" panose="020B0604020202020204" pitchFamily="34" charset="0"/>
+                        <a:buChar char="•"/>
+                      </a:pPr>
                       <a:r>
-                        <a:rPr lang="en-US" sz="1100" u="none" strike="noStrike">
+                        <a:rPr lang="en-US" sz="1100" u="none" strike="noStrike" dirty="0">
                           <a:effectLst/>
                         </a:rPr>
-                        <a:t>Prioritize loan offers to customers with credit grades A, B, and C. Explore targeted marketing campaigns to attract high-grade customers within the 6-9 years of employment segment. Consider offering competitive interest rates for high-grade customers to remain competitive while potentially increasing loan volume. Analyze the profitability of this segment while considering the lower interest rates.</a:t>
+                        <a:t>Prioritize loan offers to customers with credit grades A, B, and C. </a:t>
                       </a:r>
-                      <a:endParaRPr lang="en-US" sz="1100" b="0" i="0" u="none" strike="noStrike">
+                    </a:p>
+                    <a:p>
+                      <a:pPr marL="171450" indent="-171450" algn="l" fontAlgn="b">
+                        <a:buFont typeface="Arial" panose="020B0604020202020204" pitchFamily="34" charset="0"/>
+                        <a:buChar char="•"/>
+                      </a:pPr>
+                      <a:r>
+                        <a:rPr lang="en-US" sz="1100" u="none" strike="noStrike" dirty="0">
+                          <a:effectLst/>
+                        </a:rPr>
+                        <a:t>Explore targeted marketing campaigns to attract high-grade customers within the 6-9 years of employment segment. </a:t>
+                      </a:r>
+                    </a:p>
+                    <a:p>
+                      <a:pPr marL="171450" indent="-171450" algn="l" fontAlgn="b">
+                        <a:buFont typeface="Arial" panose="020B0604020202020204" pitchFamily="34" charset="0"/>
+                        <a:buChar char="•"/>
+                      </a:pPr>
+                      <a:r>
+                        <a:rPr lang="en-US" sz="1100" u="none" strike="noStrike" dirty="0">
+                          <a:effectLst/>
+                        </a:rPr>
+                        <a:t>Consider offering competitive interest rates for high-grade customers to remain competitive while potentially increasing loan volume. </a:t>
+                      </a:r>
+                    </a:p>
+                    <a:p>
+                      <a:pPr marL="171450" indent="-171450" algn="l" fontAlgn="b">
+                        <a:buFont typeface="Arial" panose="020B0604020202020204" pitchFamily="34" charset="0"/>
+                        <a:buChar char="•"/>
+                      </a:pPr>
+                      <a:r>
+                        <a:rPr lang="en-US" sz="1100" u="none" strike="noStrike" dirty="0">
+                          <a:effectLst/>
+                        </a:rPr>
+                        <a:t>Analyze the profitability of this segment while considering the lower interest rates.</a:t>
+                      </a:r>
+                      <a:endParaRPr lang="en-US" sz="1100" b="0" i="0" u="none" strike="noStrike" dirty="0">
                         <a:solidFill>
                           <a:srgbClr val="000000"/>
                         </a:solidFill>
@@ -12933,7 +13259,11 @@
                       </a:endParaRPr>
                     </a:p>
                   </a:txBody>
-                  <a:tcPr marL="6799" marR="6799" marT="6799" marB="0" anchor="b"/>
+                  <a:tcPr marL="109728" marR="109728" marT="109728" marB="109728" anchor="ctr">
+                    <a:solidFill>
+                      <a:srgbClr val="E6F4FE"/>
+                    </a:solidFill>
+                  </a:tcPr>
                 </a:tc>
                 <a:extLst>
                   <a:ext uri="{0D108BD9-81ED-4DB2-BD59-A6C34878D82A}">
@@ -12941,13 +13271,13 @@
                   </a:ext>
                 </a:extLst>
               </a:tr>
-              <a:tr h="982520">
+              <a:tr h="875399">
                 <a:tc>
                   <a:txBody>
                     <a:bodyPr/>
                     <a:lstStyle/>
                     <a:p>
-                      <a:pPr algn="l" fontAlgn="b"/>
+                      <a:pPr algn="ctr" fontAlgn="b"/>
                       <a:r>
                         <a:rPr lang="en-US" sz="1100" u="none" strike="noStrike" dirty="0">
                           <a:effectLst/>
@@ -12963,14 +13293,18 @@
                       </a:endParaRPr>
                     </a:p>
                   </a:txBody>
-                  <a:tcPr marL="6799" marR="6799" marT="6799" marB="0" anchor="b"/>
+                  <a:tcPr marL="109728" marR="109728" marT="109728" marB="109728" anchor="ctr">
+                    <a:solidFill>
+                      <a:srgbClr val="E6F4FE"/>
+                    </a:solidFill>
+                  </a:tcPr>
                 </a:tc>
                 <a:tc>
                   <a:txBody>
                     <a:bodyPr/>
                     <a:lstStyle/>
                     <a:p>
-                      <a:pPr algn="l" fontAlgn="b"/>
+                      <a:pPr algn="ctr" fontAlgn="b"/>
                       <a:r>
                         <a:rPr lang="en-US" sz="1100" u="none" strike="noStrike" dirty="0">
                           <a:effectLst/>
@@ -12986,19 +13320,62 @@
                       </a:endParaRPr>
                     </a:p>
                   </a:txBody>
-                  <a:tcPr marL="6799" marR="6799" marT="6799" marB="0" anchor="b"/>
+                  <a:tcPr marL="109728" marR="109728" marT="109728" marB="109728" anchor="ctr">
+                    <a:solidFill>
+                      <a:srgbClr val="E6F4FE"/>
+                    </a:solidFill>
+                  </a:tcPr>
                 </a:tc>
                 <a:tc>
                   <a:txBody>
                     <a:bodyPr/>
                     <a:lstStyle/>
                     <a:p>
-                      <a:pPr algn="l" fontAlgn="b"/>
+                      <a:pPr marL="171450" indent="-171450" algn="l" fontAlgn="b">
+                        <a:buFont typeface="Arial" panose="020B0604020202020204" pitchFamily="34" charset="0"/>
+                        <a:buChar char="•"/>
+                      </a:pPr>
                       <a:r>
                         <a:rPr lang="en-US" sz="1100" u="none" strike="noStrike" dirty="0">
                           <a:effectLst/>
                         </a:rPr>
-                        <a:t>Implement loyalty programs or reward systems for customers with consistently positive payment histories. Educate customers on the importance of maintaining good credit scores and minimizing derogatory records. Offer financial counseling services to assist customers in improving their creditworthiness. Monitor the impact of these incentives on loan approval rates and customer retention.</a:t>
+                        <a:t>Implement loyalty programs or reward systems for customers with consistently positive payment histories. </a:t>
+                      </a:r>
+                    </a:p>
+                    <a:p>
+                      <a:pPr marL="171450" indent="-171450" algn="l" fontAlgn="b">
+                        <a:buFont typeface="Arial" panose="020B0604020202020204" pitchFamily="34" charset="0"/>
+                        <a:buChar char="•"/>
+                      </a:pPr>
+                      <a:r>
+                        <a:rPr lang="en-US" sz="1100" u="none" strike="noStrike" dirty="0">
+                          <a:effectLst/>
+                        </a:rPr>
+                        <a:t>Educate customers on the importance of maintaining good credit scores and minimizing derogatory records. </a:t>
+                      </a:r>
+                    </a:p>
+                    <a:p>
+                      <a:pPr marL="171450" indent="-171450" algn="l" fontAlgn="b">
+                        <a:buFont typeface="Arial" panose="020B0604020202020204" pitchFamily="34" charset="0"/>
+                        <a:buChar char="•"/>
+                      </a:pPr>
+                      <a:r>
+                        <a:rPr lang="en-US" sz="1100" u="none" strike="noStrike" dirty="0">
+                          <a:effectLst/>
+                        </a:rPr>
+                        <a:t>Offer financial counseling services to assist customers in improving their creditworthiness. </a:t>
+                      </a:r>
+                    </a:p>
+                    <a:p>
+                      <a:pPr marL="171450" indent="-171450" algn="l" fontAlgn="b">
+                        <a:buFont typeface="Arial" panose="020B0604020202020204" pitchFamily="34" charset="0"/>
+                        <a:buChar char="•"/>
+                      </a:pPr>
+                      <a:r>
+                        <a:rPr lang="en-US" sz="1100" u="none" strike="noStrike" dirty="0">
+                          <a:effectLst/>
+                        </a:rPr>
+                        <a:t>Monitor the impact of these incentives on loan approval rates and customer retention.</a:t>
                       </a:r>
                       <a:endParaRPr lang="en-US" sz="1100" b="0" i="0" u="none" strike="noStrike" dirty="0">
                         <a:solidFill>
@@ -13009,7 +13386,11 @@
                       </a:endParaRPr>
                     </a:p>
                   </a:txBody>
-                  <a:tcPr marL="6799" marR="6799" marT="6799" marB="0" anchor="b"/>
+                  <a:tcPr marL="109728" marR="109728" marT="109728" marB="109728" anchor="ctr">
+                    <a:solidFill>
+                      <a:srgbClr val="E6F4FE"/>
+                    </a:solidFill>
+                  </a:tcPr>
                 </a:tc>
                 <a:extLst>
                   <a:ext uri="{0D108BD9-81ED-4DB2-BD59-A6C34878D82A}">
@@ -13017,13 +13398,13 @@
                   </a:ext>
                 </a:extLst>
               </a:tr>
-              <a:tr h="1016175">
+              <a:tr h="1032026">
                 <a:tc>
                   <a:txBody>
                     <a:bodyPr/>
                     <a:lstStyle/>
                     <a:p>
-                      <a:pPr algn="l" fontAlgn="b"/>
+                      <a:pPr algn="ctr" fontAlgn="b"/>
                       <a:r>
                         <a:rPr lang="en-US" sz="1100" u="none" strike="noStrike">
                           <a:effectLst/>
@@ -13039,14 +13420,18 @@
                       </a:endParaRPr>
                     </a:p>
                   </a:txBody>
-                  <a:tcPr marL="6799" marR="6799" marT="6799" marB="0" anchor="b"/>
+                  <a:tcPr marL="109728" marR="109728" marT="109728" marB="109728" anchor="ctr">
+                    <a:solidFill>
+                      <a:srgbClr val="E6F4FE"/>
+                    </a:solidFill>
+                  </a:tcPr>
                 </a:tc>
                 <a:tc>
                   <a:txBody>
                     <a:bodyPr/>
                     <a:lstStyle/>
                     <a:p>
-                      <a:pPr algn="l" fontAlgn="b"/>
+                      <a:pPr algn="ctr" fontAlgn="b"/>
                       <a:r>
                         <a:rPr lang="en-US" sz="1100" u="none" strike="noStrike" dirty="0">
                           <a:effectLst/>
@@ -13062,19 +13447,62 @@
                       </a:endParaRPr>
                     </a:p>
                   </a:txBody>
-                  <a:tcPr marL="6799" marR="6799" marT="6799" marB="0" anchor="b"/>
+                  <a:tcPr marL="109728" marR="109728" marT="109728" marB="109728" anchor="ctr">
+                    <a:solidFill>
+                      <a:srgbClr val="E6F4FE"/>
+                    </a:solidFill>
+                  </a:tcPr>
                 </a:tc>
                 <a:tc>
                   <a:txBody>
                     <a:bodyPr/>
                     <a:lstStyle/>
                     <a:p>
-                      <a:pPr algn="l" fontAlgn="b"/>
+                      <a:pPr marL="171450" indent="-171450" algn="l" fontAlgn="b">
+                        <a:buFont typeface="Arial" panose="020B0604020202020204" pitchFamily="34" charset="0"/>
+                        <a:buChar char="•"/>
+                      </a:pPr>
                       <a:r>
                         <a:rPr lang="en-US" sz="1100" u="none" strike="noStrike" dirty="0">
                           <a:effectLst/>
                         </a:rPr>
-                        <a:t>Educate customers on the benefits of longer loan terms, such as lower monthly installments and potential long-term cost savings. Offer flexible loan term options to cater to individual customer needs and financial situations. Clearly communicate the impact of loan term on total interest payments to ensure transparency. Monitor customer satisfaction and repayment rates across different loan terms.</a:t>
+                        <a:t>Educate customers on the benefits of longer loan terms, such as lower monthly installments and potential long-term cost savings. </a:t>
+                      </a:r>
+                    </a:p>
+                    <a:p>
+                      <a:pPr marL="171450" indent="-171450" algn="l" fontAlgn="b">
+                        <a:buFont typeface="Arial" panose="020B0604020202020204" pitchFamily="34" charset="0"/>
+                        <a:buChar char="•"/>
+                      </a:pPr>
+                      <a:r>
+                        <a:rPr lang="en-US" sz="1100" u="none" strike="noStrike" dirty="0">
+                          <a:effectLst/>
+                        </a:rPr>
+                        <a:t>Offer flexible loan term options to cater to individual customer needs and financial situations. </a:t>
+                      </a:r>
+                    </a:p>
+                    <a:p>
+                      <a:pPr marL="171450" indent="-171450" algn="l" fontAlgn="b">
+                        <a:buFont typeface="Arial" panose="020B0604020202020204" pitchFamily="34" charset="0"/>
+                        <a:buChar char="•"/>
+                      </a:pPr>
+                      <a:r>
+                        <a:rPr lang="en-US" sz="1100" u="none" strike="noStrike" dirty="0">
+                          <a:effectLst/>
+                        </a:rPr>
+                        <a:t>Clearly communicate the impact of loan term on total interest payments to ensure transparency. </a:t>
+                      </a:r>
+                    </a:p>
+                    <a:p>
+                      <a:pPr marL="171450" indent="-171450" algn="l" fontAlgn="b">
+                        <a:buFont typeface="Arial" panose="020B0604020202020204" pitchFamily="34" charset="0"/>
+                        <a:buChar char="•"/>
+                      </a:pPr>
+                      <a:r>
+                        <a:rPr lang="en-US" sz="1100" u="none" strike="noStrike" dirty="0">
+                          <a:effectLst/>
+                        </a:rPr>
+                        <a:t>Monitor customer satisfaction and repayment rates across different loan terms.</a:t>
                       </a:r>
                       <a:endParaRPr lang="en-US" sz="1100" b="0" i="0" u="none" strike="noStrike" dirty="0">
                         <a:solidFill>
@@ -13085,7 +13513,11 @@
                       </a:endParaRPr>
                     </a:p>
                   </a:txBody>
-                  <a:tcPr marL="6799" marR="6799" marT="6799" marB="0" anchor="b"/>
+                  <a:tcPr marL="109728" marR="109728" marT="109728" marB="109728" anchor="ctr">
+                    <a:solidFill>
+                      <a:srgbClr val="E6F4FE"/>
+                    </a:solidFill>
+                  </a:tcPr>
                 </a:tc>
                 <a:extLst>
                   <a:ext uri="{0D108BD9-81ED-4DB2-BD59-A6C34878D82A}">
@@ -13093,13 +13525,13 @@
                   </a:ext>
                 </a:extLst>
               </a:tr>
-              <a:tr h="982520">
+              <a:tr h="875399">
                 <a:tc>
                   <a:txBody>
                     <a:bodyPr/>
                     <a:lstStyle/>
                     <a:p>
-                      <a:pPr algn="l" fontAlgn="b"/>
+                      <a:pPr algn="ctr" fontAlgn="b"/>
                       <a:r>
                         <a:rPr lang="en-US" sz="1100" u="none" strike="noStrike">
                           <a:effectLst/>
@@ -13115,14 +13547,18 @@
                       </a:endParaRPr>
                     </a:p>
                   </a:txBody>
-                  <a:tcPr marL="6799" marR="6799" marT="6799" marB="0" anchor="b"/>
+                  <a:tcPr marL="109728" marR="109728" marT="109728" marB="109728" anchor="ctr">
+                    <a:solidFill>
+                      <a:srgbClr val="E6F4FE"/>
+                    </a:solidFill>
+                  </a:tcPr>
                 </a:tc>
                 <a:tc>
                   <a:txBody>
                     <a:bodyPr/>
                     <a:lstStyle/>
                     <a:p>
-                      <a:pPr algn="l" fontAlgn="b"/>
+                      <a:pPr algn="ctr" fontAlgn="b"/>
                       <a:r>
                         <a:rPr lang="en-US" sz="1100" u="none" strike="noStrike" dirty="0">
                           <a:effectLst/>
@@ -13138,19 +13574,62 @@
                       </a:endParaRPr>
                     </a:p>
                   </a:txBody>
-                  <a:tcPr marL="6799" marR="6799" marT="6799" marB="0" anchor="b"/>
+                  <a:tcPr marL="109728" marR="109728" marT="109728" marB="109728" anchor="ctr">
+                    <a:solidFill>
+                      <a:srgbClr val="E6F4FE"/>
+                    </a:solidFill>
+                  </a:tcPr>
                 </a:tc>
                 <a:tc>
                   <a:txBody>
                     <a:bodyPr/>
                     <a:lstStyle/>
                     <a:p>
-                      <a:pPr algn="l" fontAlgn="b"/>
+                      <a:pPr marL="171450" indent="-171450" algn="l" fontAlgn="b">
+                        <a:buFont typeface="Arial" panose="020B0604020202020204" pitchFamily="34" charset="0"/>
+                        <a:buChar char="•"/>
+                      </a:pPr>
                       <a:r>
                         <a:rPr lang="en-US" sz="1100" u="none" strike="noStrike" dirty="0">
                           <a:effectLst/>
                         </a:rPr>
-                        <a:t>Implement a robust debt-to-income (DTI) ratio assessment as a key factor in loan approval decisions. Establish clear DTI thresholds for different loan products and risk categories. Develop a scoring system that incorporates DTI along with other relevant credit risk factors. Regularly review and adjust DTI thresholds based on market trends and internal risk assessments.</a:t>
+                        <a:t>Implement a robust debt-to-income (DTI) ratio assessment as a key factor in loan approval decisions. </a:t>
+                      </a:r>
+                    </a:p>
+                    <a:p>
+                      <a:pPr marL="171450" indent="-171450" algn="l" fontAlgn="b">
+                        <a:buFont typeface="Arial" panose="020B0604020202020204" pitchFamily="34" charset="0"/>
+                        <a:buChar char="•"/>
+                      </a:pPr>
+                      <a:r>
+                        <a:rPr lang="en-US" sz="1100" u="none" strike="noStrike" dirty="0">
+                          <a:effectLst/>
+                        </a:rPr>
+                        <a:t>Establish clear DTI thresholds for different loan products and risk categories. </a:t>
+                      </a:r>
+                    </a:p>
+                    <a:p>
+                      <a:pPr marL="171450" indent="-171450" algn="l" fontAlgn="b">
+                        <a:buFont typeface="Arial" panose="020B0604020202020204" pitchFamily="34" charset="0"/>
+                        <a:buChar char="•"/>
+                      </a:pPr>
+                      <a:r>
+                        <a:rPr lang="en-US" sz="1100" u="none" strike="noStrike" dirty="0">
+                          <a:effectLst/>
+                        </a:rPr>
+                        <a:t>Develop a scoring system that incorporates DTI along with other relevant credit risk factors. </a:t>
+                      </a:r>
+                    </a:p>
+                    <a:p>
+                      <a:pPr marL="171450" indent="-171450" algn="l" fontAlgn="b">
+                        <a:buFont typeface="Arial" panose="020B0604020202020204" pitchFamily="34" charset="0"/>
+                        <a:buChar char="•"/>
+                      </a:pPr>
+                      <a:r>
+                        <a:rPr lang="en-US" sz="1100" u="none" strike="noStrike" dirty="0">
+                          <a:effectLst/>
+                        </a:rPr>
+                        <a:t>Regularly review and adjust DTI thresholds based on market trends and internal risk assessments.</a:t>
                       </a:r>
                       <a:endParaRPr lang="en-US" sz="1100" b="0" i="0" u="none" strike="noStrike" dirty="0">
                         <a:solidFill>
@@ -13161,7 +13640,11 @@
                       </a:endParaRPr>
                     </a:p>
                   </a:txBody>
-                  <a:tcPr marL="6799" marR="6799" marT="6799" marB="0" anchor="b"/>
+                  <a:tcPr marL="109728" marR="109728" marT="109728" marB="109728" anchor="ctr">
+                    <a:solidFill>
+                      <a:srgbClr val="E6F4FE"/>
+                    </a:solidFill>
+                  </a:tcPr>
                 </a:tc>
                 <a:extLst>
                   <a:ext uri="{0D108BD9-81ED-4DB2-BD59-A6C34878D82A}">
@@ -13169,20 +13652,20 @@
                   </a:ext>
                 </a:extLst>
               </a:tr>
-              <a:tr h="982520">
+              <a:tr h="875399">
                 <a:tc>
                   <a:txBody>
                     <a:bodyPr/>
                     <a:lstStyle/>
                     <a:p>
-                      <a:pPr algn="l" fontAlgn="b"/>
+                      <a:pPr algn="ctr" fontAlgn="b"/>
                       <a:r>
-                        <a:rPr lang="en-US" sz="1100" u="none" strike="noStrike">
+                        <a:rPr lang="en-US" sz="1100" u="none" strike="noStrike" dirty="0">
                           <a:effectLst/>
                         </a:rPr>
                         <a:t>Negative</a:t>
                       </a:r>
-                      <a:endParaRPr lang="en-US" sz="1100" b="0" i="0" u="none" strike="noStrike">
+                      <a:endParaRPr lang="en-US" sz="1100" b="0" i="0" u="none" strike="noStrike" dirty="0">
                         <a:solidFill>
                           <a:srgbClr val="000000"/>
                         </a:solidFill>
@@ -13191,14 +13674,21 @@
                       </a:endParaRPr>
                     </a:p>
                   </a:txBody>
-                  <a:tcPr marL="6799" marR="6799" marT="6799" marB="0" anchor="b"/>
+                  <a:tcPr marL="109728" marR="109728" marT="109728" marB="109728" anchor="ctr">
+                    <a:solidFill>
+                      <a:schemeClr val="accent5">
+                        <a:lumMod val="20000"/>
+                        <a:lumOff val="80000"/>
+                      </a:schemeClr>
+                    </a:solidFill>
+                  </a:tcPr>
                 </a:tc>
                 <a:tc>
                   <a:txBody>
                     <a:bodyPr/>
                     <a:lstStyle/>
                     <a:p>
-                      <a:pPr algn="l" fontAlgn="b"/>
+                      <a:pPr algn="ctr" fontAlgn="b"/>
                       <a:r>
                         <a:rPr lang="en-US" sz="1100" u="none" strike="noStrike" dirty="0">
                           <a:effectLst/>
@@ -13214,19 +13704,53 @@
                       </a:endParaRPr>
                     </a:p>
                   </a:txBody>
-                  <a:tcPr marL="6799" marR="6799" marT="6799" marB="0" anchor="b"/>
+                  <a:tcPr marL="109728" marR="109728" marT="109728" marB="109728" anchor="ctr">
+                    <a:solidFill>
+                      <a:schemeClr val="accent5">
+                        <a:lumMod val="20000"/>
+                        <a:lumOff val="80000"/>
+                      </a:schemeClr>
+                    </a:solidFill>
+                  </a:tcPr>
                 </a:tc>
                 <a:tc>
                   <a:txBody>
                     <a:bodyPr/>
                     <a:lstStyle/>
                     <a:p>
-                      <a:pPr algn="l" fontAlgn="b"/>
+                      <a:pPr marL="171450" indent="-171450" algn="l" fontAlgn="b">
+                        <a:buFont typeface="Arial" panose="020B0604020202020204" pitchFamily="34" charset="0"/>
+                        <a:buChar char="•"/>
+                      </a:pPr>
                       <a:r>
                         <a:rPr lang="en-US" sz="1100" u="none" strike="noStrike" dirty="0">
                           <a:effectLst/>
                         </a:rPr>
-                        <a:t>Avoid over-concentrating loan portfolios in the low-risk (high-grade) segment, as this may limit overall profitability. Diversify lending strategies to include moderate-risk segments while maintaining appropriate risk controls. Continuously monitor the risk-return profile of the loan portfolio and adjust lending strategies accordingly.</a:t>
+                        <a:t>Avoid over-concentrating loan portfolios in the low-risk (high-grade) segment, as this may limit overall profitability.</a:t>
+                      </a:r>
+                    </a:p>
+                    <a:p>
+                      <a:pPr marL="171450" indent="-171450" algn="l" fontAlgn="b">
+                        <a:buFont typeface="Arial" panose="020B0604020202020204" pitchFamily="34" charset="0"/>
+                        <a:buChar char="•"/>
+                      </a:pPr>
+                      <a:r>
+                        <a:rPr lang="en-US" sz="1100" u="none" strike="noStrike" dirty="0">
+                          <a:effectLst/>
+                        </a:rPr>
+                        <a:t>Diversify lending strategies to include moderate-risk segments while maintaining appropriate risk controls.</a:t>
+                      </a:r>
+                    </a:p>
+                    <a:p>
+                      <a:pPr marL="171450" indent="-171450" algn="l" fontAlgn="b">
+                        <a:buFont typeface="Arial" panose="020B0604020202020204" pitchFamily="34" charset="0"/>
+                        <a:buChar char="•"/>
+                      </a:pPr>
+                      <a:r>
+                        <a:rPr lang="en-US" sz="1100" u="none" strike="noStrike" dirty="0">
+                          <a:effectLst/>
+                        </a:rPr>
+                        <a:t>Continuously monitor the risk-return profile of the loan portfolio and adjust lending strategies accordingly.</a:t>
                       </a:r>
                       <a:endParaRPr lang="en-US" sz="1100" b="0" i="0" u="none" strike="noStrike" dirty="0">
                         <a:solidFill>
@@ -13237,7 +13761,14 @@
                       </a:endParaRPr>
                     </a:p>
                   </a:txBody>
-                  <a:tcPr marL="6799" marR="6799" marT="6799" marB="0" anchor="b"/>
+                  <a:tcPr marL="109728" marR="109728" marT="109728" marB="109728" anchor="ctr">
+                    <a:solidFill>
+                      <a:schemeClr val="accent5">
+                        <a:lumMod val="20000"/>
+                        <a:lumOff val="80000"/>
+                      </a:schemeClr>
+                    </a:solidFill>
+                  </a:tcPr>
                 </a:tc>
                 <a:extLst>
                   <a:ext uri="{0D108BD9-81ED-4DB2-BD59-A6C34878D82A}">
@@ -13338,7 +13869,29 @@
           <a:bodyPr/>
           <a:lstStyle/>
           <a:p>
+            <a:r>
+              <a:rPr lang="en-US" dirty="0"/>
+              <a:t>Facilitator: </a:t>
+            </a:r>
+            <a:r>
+              <a:rPr lang="en-US" dirty="0" err="1"/>
+              <a:t>Uvaraj</a:t>
+            </a:r>
+            <a:r>
+              <a:rPr lang="en-US" dirty="0"/>
+              <a:t> </a:t>
+            </a:r>
+            <a:r>
+              <a:rPr lang="en-US" dirty="0" err="1"/>
+              <a:t>Thulasiram</a:t>
+            </a:r>
             <a:endParaRPr lang="en-US" dirty="0"/>
+          </a:p>
+          <a:p>
+            <a:r>
+              <a:rPr lang="en-US" dirty="0"/>
+              <a:t>Team member: Vaishali Makwana</a:t>
+            </a:r>
           </a:p>
         </p:txBody>
       </p:sp>
@@ -13508,9 +14061,10 @@
               <a:buAutoNum type="arabicPeriod"/>
             </a:pPr>
             <a:r>
-              <a:rPr lang="en-US" dirty="0"/>
-              <a:t>Key Takeaway</a:t>
-            </a:r>
+              <a:rPr lang="en-US" sz="2400" dirty="0"/>
+              <a:t>Recommendations</a:t>
+            </a:r>
+            <a:endParaRPr lang="en-US" dirty="0"/>
           </a:p>
         </p:txBody>
       </p:sp>
@@ -18270,26 +18824,6 @@
 </file>
 
 <file path=customXml/item1.xml><?xml version="1.0" encoding="utf-8"?>
-<p:properties xmlns:p="http://schemas.microsoft.com/office/2006/metadata/properties" xmlns:xsi="http://www.w3.org/2001/XMLSchema-instance" xmlns:pc="http://schemas.microsoft.com/office/infopath/2007/PartnerControls">
-  <documentManagement>
-    <Background xmlns="71af3243-3dd4-4a8d-8c0d-dd76da1f02a5">false</Background>
-    <Status xmlns="71af3243-3dd4-4a8d-8c0d-dd76da1f02a5">Not started</Status>
-    <_ip_UnifiedCompliancePolicyUIAction xmlns="http://schemas.microsoft.com/sharepoint/v3" xsi:nil="true"/>
-    <Image xmlns="71af3243-3dd4-4a8d-8c0d-dd76da1f02a5">
-      <Url xsi:nil="true"/>
-      <Description xsi:nil="true"/>
-    </Image>
-    <_ip_UnifiedCompliancePolicyProperties xmlns="http://schemas.microsoft.com/sharepoint/v3" xsi:nil="true"/>
-    <ImageTagsTaxHTField xmlns="71af3243-3dd4-4a8d-8c0d-dd76da1f02a5">
-      <Terms xmlns="http://schemas.microsoft.com/office/infopath/2007/PartnerControls"/>
-    </ImageTagsTaxHTField>
-    <TaxCatchAll xmlns="230e9df3-be65-4c73-a93b-d1236ebd677e" xsi:nil="true"/>
-    <MediaServiceKeyPoints xmlns="71af3243-3dd4-4a8d-8c0d-dd76da1f02a5" xsi:nil="true"/>
-  </documentManagement>
-</p:properties>
-</file>
-
-<file path=customXml/item2.xml><?xml version="1.0" encoding="utf-8"?>
 <?mso-contentType ?>
 <FormTemplates xmlns="http://schemas.microsoft.com/sharepoint/v3/contenttype/forms">
   <Display>DocumentLibraryForm</Display>
@@ -18298,7 +18832,7 @@
 </FormTemplates>
 </file>
 
-<file path=customXml/item3.xml><?xml version="1.0" encoding="utf-8"?>
+<file path=customXml/item2.xml><?xml version="1.0" encoding="utf-8"?>
 <ct:contentTypeSchema xmlns:ct="http://schemas.microsoft.com/office/2006/metadata/contentType" xmlns:ma="http://schemas.microsoft.com/office/2006/metadata/properties/metaAttributes" ct:_="" ma:_="" ma:contentTypeName="Document" ma:contentTypeID="0x01010079F111ED35F8CC479449609E8A0923A6" ma:contentTypeVersion="28" ma:contentTypeDescription="Create a new document." ma:contentTypeScope="" ma:versionID="60f5a4f2d2b0abadcf532d48ebf9cb71">
   <xsd:schema xmlns:xsd="http://www.w3.org/2001/XMLSchema" xmlns:xs="http://www.w3.org/2001/XMLSchema" xmlns:p="http://schemas.microsoft.com/office/2006/metadata/properties" xmlns:ns1="http://schemas.microsoft.com/sharepoint/v3" xmlns:ns2="71af3243-3dd4-4a8d-8c0d-dd76da1f02a5" xmlns:ns3="16c05727-aa75-4e4a-9b5f-8a80a1165891" xmlns:ns4="230e9df3-be65-4c73-a93b-d1236ebd677e" targetNamespace="http://schemas.microsoft.com/office/2006/metadata/properties" ma:root="true" ma:fieldsID="7dd78129e6a1811f84807ad11c651531" ns1:_="" ns2:_="" ns3:_="" ns4:_="">
     <xsd:import namespace="http://schemas.microsoft.com/sharepoint/v3"/>
@@ -18610,19 +19144,27 @@
 </ct:contentTypeSchema>
 </file>
 
-<file path=customXml/itemProps1.xml><?xml version="1.0" encoding="utf-8"?>
-<ds:datastoreItem xmlns:ds="http://schemas.openxmlformats.org/officeDocument/2006/customXml" ds:itemID="{4F4B194E-8B30-4377-8C59-ECFB902D2A26}">
-  <ds:schemaRefs>
-    <ds:schemaRef ds:uri="http://schemas.microsoft.com/office/2006/metadata/properties"/>
-    <ds:schemaRef ds:uri="http://schemas.microsoft.com/office/infopath/2007/PartnerControls"/>
-    <ds:schemaRef ds:uri="71af3243-3dd4-4a8d-8c0d-dd76da1f02a5"/>
-    <ds:schemaRef ds:uri="http://schemas.microsoft.com/sharepoint/v3"/>
-    <ds:schemaRef ds:uri="230e9df3-be65-4c73-a93b-d1236ebd677e"/>
-  </ds:schemaRefs>
-</ds:datastoreItem>
+<file path=customXml/item3.xml><?xml version="1.0" encoding="utf-8"?>
+<p:properties xmlns:p="http://schemas.microsoft.com/office/2006/metadata/properties" xmlns:xsi="http://www.w3.org/2001/XMLSchema-instance" xmlns:pc="http://schemas.microsoft.com/office/infopath/2007/PartnerControls">
+  <documentManagement>
+    <Background xmlns="71af3243-3dd4-4a8d-8c0d-dd76da1f02a5">false</Background>
+    <Status xmlns="71af3243-3dd4-4a8d-8c0d-dd76da1f02a5">Not started</Status>
+    <_ip_UnifiedCompliancePolicyUIAction xmlns="http://schemas.microsoft.com/sharepoint/v3" xsi:nil="true"/>
+    <Image xmlns="71af3243-3dd4-4a8d-8c0d-dd76da1f02a5">
+      <Url xsi:nil="true"/>
+      <Description xsi:nil="true"/>
+    </Image>
+    <_ip_UnifiedCompliancePolicyProperties xmlns="http://schemas.microsoft.com/sharepoint/v3" xsi:nil="true"/>
+    <ImageTagsTaxHTField xmlns="71af3243-3dd4-4a8d-8c0d-dd76da1f02a5">
+      <Terms xmlns="http://schemas.microsoft.com/office/infopath/2007/PartnerControls"/>
+    </ImageTagsTaxHTField>
+    <TaxCatchAll xmlns="230e9df3-be65-4c73-a93b-d1236ebd677e" xsi:nil="true"/>
+    <MediaServiceKeyPoints xmlns="71af3243-3dd4-4a8d-8c0d-dd76da1f02a5" xsi:nil="true"/>
+  </documentManagement>
+</p:properties>
 </file>
 
-<file path=customXml/itemProps2.xml><?xml version="1.0" encoding="utf-8"?>
+<file path=customXml/itemProps1.xml><?xml version="1.0" encoding="utf-8"?>
 <ds:datastoreItem xmlns:ds="http://schemas.openxmlformats.org/officeDocument/2006/customXml" ds:itemID="{C21FFAC0-05A2-416A-B06C-C248395482CF}">
   <ds:schemaRefs>
     <ds:schemaRef ds:uri="http://schemas.microsoft.com/sharepoint/v3/contenttype/forms"/>
@@ -18630,7 +19172,7 @@
 </ds:datastoreItem>
 </file>
 
-<file path=customXml/itemProps3.xml><?xml version="1.0" encoding="utf-8"?>
+<file path=customXml/itemProps2.xml><?xml version="1.0" encoding="utf-8"?>
 <ds:datastoreItem xmlns:ds="http://schemas.openxmlformats.org/officeDocument/2006/customXml" ds:itemID="{92DB9E12-8AC3-4138-BF4D-720A5525AB10}">
   <ds:schemaRefs>
     <ds:schemaRef ds:uri="http://schemas.microsoft.com/office/2006/metadata/contentType"/>
@@ -18651,6 +19193,18 @@
 </ds:datastoreItem>
 </file>
 
+<file path=customXml/itemProps3.xml><?xml version="1.0" encoding="utf-8"?>
+<ds:datastoreItem xmlns:ds="http://schemas.openxmlformats.org/officeDocument/2006/customXml" ds:itemID="{4F4B194E-8B30-4377-8C59-ECFB902D2A26}">
+  <ds:schemaRefs>
+    <ds:schemaRef ds:uri="http://schemas.microsoft.com/office/2006/metadata/properties"/>
+    <ds:schemaRef ds:uri="http://schemas.microsoft.com/office/infopath/2007/PartnerControls"/>
+    <ds:schemaRef ds:uri="71af3243-3dd4-4a8d-8c0d-dd76da1f02a5"/>
+    <ds:schemaRef ds:uri="http://schemas.microsoft.com/sharepoint/v3"/>
+    <ds:schemaRef ds:uri="230e9df3-be65-4c73-a93b-d1236ebd677e"/>
+  </ds:schemaRefs>
+</ds:datastoreItem>
+</file>
+
 <file path=docMetadata/LabelInfo.xml><?xml version="1.0" encoding="utf-8"?>
 <clbl:labelList xmlns:clbl="http://schemas.microsoft.com/office/2020/mipLabelMetadata"/>
 </file>
</xml_diff>